<commit_message>
Update high resolution example (#8).
</commit_message>
<xml_diff>
--- a/tests/sources/details_test.pptx
+++ b/tests/sources/details_test.pptx
@@ -610,7 +610,15 @@
           <a:p>
             <a:r>
               <a:rPr lang="en-US" dirty="0"/>
-              <a:t>.id(hires)</a:t>
+              <a:t>.id(hires</a:t>
+            </a:r>
+            <a:r>
+              <a:rPr lang="en-US"/>
+              <a:t>) outline(</a:t>
+            </a:r>
+            <a:r>
+              <a:rPr lang="en-US" dirty="0"/>
+              <a:t>a1)</a:t>
             </a:r>
           </a:p>
         </p:txBody>
@@ -3934,7 +3942,7 @@
       </p:sp>
       <p:sp>
         <p:nvSpPr>
-          <p:cNvPr id="4" name=".id(lowres) details(hires) scale(a1) zoom(6)">
+          <p:cNvPr id="4" name=".id(lowres) details(hires, 6)">
             <a:extLst>
               <a:ext uri="{FF2B5EF4-FFF2-40B4-BE49-F238E27FC236}">
                 <a16:creationId xmlns:a16="http://schemas.microsoft.com/office/drawing/2014/main" id="{48E7D4F8-A9F2-FD43-98A2-9747CA640B90}"/>

</xml_diff>

<commit_message>
More testing for feature details (#8).
</commit_message>
<xml_diff>
--- a/tests/sources/details_test.pptx
+++ b/tests/sources/details_test.pptx
@@ -5,11 +5,12 @@
     <p:sldMasterId id="2147483648" r:id="rId1"/>
   </p:sldMasterIdLst>
   <p:notesMasterIdLst>
-    <p:notesMasterId r:id="rId4"/>
+    <p:notesMasterId r:id="rId5"/>
   </p:notesMasterIdLst>
   <p:sldIdLst>
     <p:sldId id="257" r:id="rId2"/>
     <p:sldId id="258" r:id="rId3"/>
+    <p:sldId id="259" r:id="rId4"/>
   </p:sldIdLst>
   <p:sldSz cx="12192000" cy="6858000"/>
   <p:notesSz cx="6858000" cy="9144000"/>
@@ -209,7 +210,7 @@
           <a:p>
             <a:fld id="{28A6B6D9-41FF-694B-9E2C-02A8BC192467}" type="datetimeFigureOut">
               <a:rPr lang="en-US" smtClean="0"/>
-              <a:t>9/4/20</a:t>
+              <a:t>9/15/20</a:t>
             </a:fld>
             <a:endParaRPr lang="en-US"/>
           </a:p>
@@ -610,15 +611,7 @@
           <a:p>
             <a:r>
               <a:rPr lang="en-US" dirty="0"/>
-              <a:t>.id(hires</a:t>
-            </a:r>
-            <a:r>
-              <a:rPr lang="en-US"/>
-              <a:t>) outline(</a:t>
-            </a:r>
-            <a:r>
-              <a:rPr lang="en-US" dirty="0"/>
-              <a:t>a1)</a:t>
+              <a:t>.id(hires) outline(a1)</a:t>
             </a:r>
           </a:p>
         </p:txBody>
@@ -650,6 +643,93 @@
     <p:extLst>
       <p:ext uri="{BB962C8B-B14F-4D97-AF65-F5344CB8AC3E}">
         <p14:creationId xmlns:p14="http://schemas.microsoft.com/office/powerpoint/2010/main" val="3721604960"/>
+      </p:ext>
+    </p:extLst>
+  </p:cSld>
+  <p:clrMapOvr>
+    <a:masterClrMapping/>
+  </p:clrMapOvr>
+</p:notes>
+</file>
+
+<file path=ppt/notesSlides/notesSlide3.xml><?xml version="1.0" encoding="utf-8"?>
+<p:notes xmlns:a="http://schemas.openxmlformats.org/drawingml/2006/main" xmlns:r="http://schemas.openxmlformats.org/officeDocument/2006/relationships" xmlns:p="http://schemas.openxmlformats.org/presentationml/2006/main">
+  <p:cSld>
+    <p:spTree>
+      <p:nvGrpSpPr>
+        <p:cNvPr id="1" name=""/>
+        <p:cNvGrpSpPr/>
+        <p:nvPr/>
+      </p:nvGrpSpPr>
+      <p:grpSpPr>
+        <a:xfrm>
+          <a:off x="0" y="0"/>
+          <a:ext cx="0" cy="0"/>
+          <a:chOff x="0" y="0"/>
+          <a:chExt cx="0" cy="0"/>
+        </a:xfrm>
+      </p:grpSpPr>
+      <p:sp>
+        <p:nvSpPr>
+          <p:cNvPr id="2" name="Slide Image Placeholder 1"/>
+          <p:cNvSpPr>
+            <a:spLocks noGrp="1" noRot="1" noChangeAspect="1"/>
+          </p:cNvSpPr>
+          <p:nvPr>
+            <p:ph type="sldImg"/>
+          </p:nvPr>
+        </p:nvSpPr>
+        <p:spPr/>
+      </p:sp>
+      <p:sp>
+        <p:nvSpPr>
+          <p:cNvPr id="3" name="Notes Placeholder 2"/>
+          <p:cNvSpPr>
+            <a:spLocks noGrp="1"/>
+          </p:cNvSpPr>
+          <p:nvPr>
+            <p:ph type="body" idx="1"/>
+          </p:nvPr>
+        </p:nvSpPr>
+        <p:spPr/>
+        <p:txBody>
+          <a:bodyPr/>
+          <a:lstStyle/>
+          <a:p>
+            <a:r>
+              <a:rPr lang="en-US" dirty="0"/>
+              <a:t>.id(super) outline(x)</a:t>
+            </a:r>
+          </a:p>
+        </p:txBody>
+      </p:sp>
+      <p:sp>
+        <p:nvSpPr>
+          <p:cNvPr id="4" name="Slide Number Placeholder 3"/>
+          <p:cNvSpPr>
+            <a:spLocks noGrp="1"/>
+          </p:cNvSpPr>
+          <p:nvPr>
+            <p:ph type="sldNum" sz="quarter" idx="5"/>
+          </p:nvPr>
+        </p:nvSpPr>
+        <p:spPr/>
+        <p:txBody>
+          <a:bodyPr/>
+          <a:lstStyle/>
+          <a:p>
+            <a:fld id="{BDA02DFF-EF98-D24F-BC52-773C3C447847}" type="slidenum">
+              <a:rPr lang="en-US" smtClean="0"/>
+              <a:t>3</a:t>
+            </a:fld>
+            <a:endParaRPr lang="en-US"/>
+          </a:p>
+        </p:txBody>
+      </p:sp>
+    </p:spTree>
+    <p:extLst>
+      <p:ext uri="{BB962C8B-B14F-4D97-AF65-F5344CB8AC3E}">
+        <p14:creationId xmlns:p14="http://schemas.microsoft.com/office/powerpoint/2010/main" val="175076399"/>
       </p:ext>
     </p:extLst>
   </p:cSld>
@@ -808,7 +888,7 @@
           <a:p>
             <a:fld id="{9B2C672E-4C60-BA40-A9EB-4E1C07F47054}" type="datetimeFigureOut">
               <a:rPr lang="en-US" smtClean="0"/>
-              <a:t>9/4/20</a:t>
+              <a:t>9/15/20</a:t>
             </a:fld>
             <a:endParaRPr lang="en-US"/>
           </a:p>
@@ -1008,7 +1088,7 @@
           <a:p>
             <a:fld id="{9B2C672E-4C60-BA40-A9EB-4E1C07F47054}" type="datetimeFigureOut">
               <a:rPr lang="en-US" smtClean="0"/>
-              <a:t>9/4/20</a:t>
+              <a:t>9/15/20</a:t>
             </a:fld>
             <a:endParaRPr lang="en-US"/>
           </a:p>
@@ -1218,7 +1298,7 @@
           <a:p>
             <a:fld id="{9B2C672E-4C60-BA40-A9EB-4E1C07F47054}" type="datetimeFigureOut">
               <a:rPr lang="en-US" smtClean="0"/>
-              <a:t>9/4/20</a:t>
+              <a:t>9/15/20</a:t>
             </a:fld>
             <a:endParaRPr lang="en-US"/>
           </a:p>
@@ -1418,7 +1498,7 @@
           <a:p>
             <a:fld id="{9B2C672E-4C60-BA40-A9EB-4E1C07F47054}" type="datetimeFigureOut">
               <a:rPr lang="en-US" smtClean="0"/>
-              <a:t>9/4/20</a:t>
+              <a:t>9/15/20</a:t>
             </a:fld>
             <a:endParaRPr lang="en-US"/>
           </a:p>
@@ -1694,7 +1774,7 @@
           <a:p>
             <a:fld id="{9B2C672E-4C60-BA40-A9EB-4E1C07F47054}" type="datetimeFigureOut">
               <a:rPr lang="en-US" smtClean="0"/>
-              <a:t>9/4/20</a:t>
+              <a:t>9/15/20</a:t>
             </a:fld>
             <a:endParaRPr lang="en-US"/>
           </a:p>
@@ -1962,7 +2042,7 @@
           <a:p>
             <a:fld id="{9B2C672E-4C60-BA40-A9EB-4E1C07F47054}" type="datetimeFigureOut">
               <a:rPr lang="en-US" smtClean="0"/>
-              <a:t>9/4/20</a:t>
+              <a:t>9/15/20</a:t>
             </a:fld>
             <a:endParaRPr lang="en-US"/>
           </a:p>
@@ -2377,7 +2457,7 @@
           <a:p>
             <a:fld id="{9B2C672E-4C60-BA40-A9EB-4E1C07F47054}" type="datetimeFigureOut">
               <a:rPr lang="en-US" smtClean="0"/>
-              <a:t>9/4/20</a:t>
+              <a:t>9/15/20</a:t>
             </a:fld>
             <a:endParaRPr lang="en-US"/>
           </a:p>
@@ -2519,7 +2599,7 @@
           <a:p>
             <a:fld id="{9B2C672E-4C60-BA40-A9EB-4E1C07F47054}" type="datetimeFigureOut">
               <a:rPr lang="en-US" smtClean="0"/>
-              <a:t>9/4/20</a:t>
+              <a:t>9/15/20</a:t>
             </a:fld>
             <a:endParaRPr lang="en-US"/>
           </a:p>
@@ -2632,7 +2712,7 @@
           <a:p>
             <a:fld id="{9B2C672E-4C60-BA40-A9EB-4E1C07F47054}" type="datetimeFigureOut">
               <a:rPr lang="en-US" smtClean="0"/>
-              <a:t>9/4/20</a:t>
+              <a:t>9/15/20</a:t>
             </a:fld>
             <a:endParaRPr lang="en-US"/>
           </a:p>
@@ -2945,7 +3025,7 @@
           <a:p>
             <a:fld id="{9B2C672E-4C60-BA40-A9EB-4E1C07F47054}" type="datetimeFigureOut">
               <a:rPr lang="en-US" smtClean="0"/>
-              <a:t>9/4/20</a:t>
+              <a:t>9/15/20</a:t>
             </a:fld>
             <a:endParaRPr lang="en-US"/>
           </a:p>
@@ -3234,7 +3314,7 @@
           <a:p>
             <a:fld id="{9B2C672E-4C60-BA40-A9EB-4E1C07F47054}" type="datetimeFigureOut">
               <a:rPr lang="en-US" smtClean="0"/>
-              <a:t>9/4/20</a:t>
+              <a:t>9/15/20</a:t>
             </a:fld>
             <a:endParaRPr lang="en-US"/>
           </a:p>
@@ -3477,7 +3557,7 @@
           <a:p>
             <a:fld id="{9B2C672E-4C60-BA40-A9EB-4E1C07F47054}" type="datetimeFigureOut">
               <a:rPr lang="en-US" smtClean="0"/>
-              <a:t>9/4/20</a:t>
+              <a:t>9/15/20</a:t>
             </a:fld>
             <a:endParaRPr lang="en-US"/>
           </a:p>
@@ -3908,12 +3988,119 @@
         </p:nvSpPr>
         <p:spPr>
           <a:xfrm>
-            <a:off x="2755556" y="1186249"/>
-            <a:ext cx="6079525" cy="3175686"/>
+            <a:off x="6589123" y="1495231"/>
+            <a:ext cx="1560995" cy="1098459"/>
           </a:xfrm>
-          <a:prstGeom prst="rect">
+          <a:custGeom>
             <a:avLst/>
-          </a:prstGeom>
+            <a:gdLst>
+              <a:gd name="connsiteX0" fmla="*/ 0 w 3546389"/>
+              <a:gd name="connsiteY0" fmla="*/ 0 h 2804983"/>
+              <a:gd name="connsiteX1" fmla="*/ 3546389 w 3546389"/>
+              <a:gd name="connsiteY1" fmla="*/ 0 h 2804983"/>
+              <a:gd name="connsiteX2" fmla="*/ 3546389 w 3546389"/>
+              <a:gd name="connsiteY2" fmla="*/ 2804983 h 2804983"/>
+              <a:gd name="connsiteX3" fmla="*/ 0 w 3546389"/>
+              <a:gd name="connsiteY3" fmla="*/ 2804983 h 2804983"/>
+              <a:gd name="connsiteX4" fmla="*/ 0 w 3546389"/>
+              <a:gd name="connsiteY4" fmla="*/ 0 h 2804983"/>
+              <a:gd name="connsiteX0" fmla="*/ 0 w 4448432"/>
+              <a:gd name="connsiteY0" fmla="*/ 444843 h 2804983"/>
+              <a:gd name="connsiteX1" fmla="*/ 4448432 w 4448432"/>
+              <a:gd name="connsiteY1" fmla="*/ 0 h 2804983"/>
+              <a:gd name="connsiteX2" fmla="*/ 4448432 w 4448432"/>
+              <a:gd name="connsiteY2" fmla="*/ 2804983 h 2804983"/>
+              <a:gd name="connsiteX3" fmla="*/ 902043 w 4448432"/>
+              <a:gd name="connsiteY3" fmla="*/ 2804983 h 2804983"/>
+              <a:gd name="connsiteX4" fmla="*/ 0 w 4448432"/>
+              <a:gd name="connsiteY4" fmla="*/ 444843 h 2804983"/>
+              <a:gd name="connsiteX0" fmla="*/ 287999 w 4736431"/>
+              <a:gd name="connsiteY0" fmla="*/ 444843 h 2804983"/>
+              <a:gd name="connsiteX1" fmla="*/ 4736431 w 4736431"/>
+              <a:gd name="connsiteY1" fmla="*/ 0 h 2804983"/>
+              <a:gd name="connsiteX2" fmla="*/ 4736431 w 4736431"/>
+              <a:gd name="connsiteY2" fmla="*/ 2804983 h 2804983"/>
+              <a:gd name="connsiteX3" fmla="*/ 1190042 w 4736431"/>
+              <a:gd name="connsiteY3" fmla="*/ 2804983 h 2804983"/>
+              <a:gd name="connsiteX4" fmla="*/ 287999 w 4736431"/>
+              <a:gd name="connsiteY4" fmla="*/ 444843 h 2804983"/>
+              <a:gd name="connsiteX0" fmla="*/ 287999 w 4736431"/>
+              <a:gd name="connsiteY0" fmla="*/ 553845 h 2913985"/>
+              <a:gd name="connsiteX1" fmla="*/ 4736431 w 4736431"/>
+              <a:gd name="connsiteY1" fmla="*/ 109002 h 2913985"/>
+              <a:gd name="connsiteX2" fmla="*/ 4736431 w 4736431"/>
+              <a:gd name="connsiteY2" fmla="*/ 2913985 h 2913985"/>
+              <a:gd name="connsiteX3" fmla="*/ 1190042 w 4736431"/>
+              <a:gd name="connsiteY3" fmla="*/ 2913985 h 2913985"/>
+              <a:gd name="connsiteX4" fmla="*/ 287999 w 4736431"/>
+              <a:gd name="connsiteY4" fmla="*/ 553845 h 2913985"/>
+              <a:gd name="connsiteX0" fmla="*/ 287999 w 4736431"/>
+              <a:gd name="connsiteY0" fmla="*/ 1007167 h 3367307"/>
+              <a:gd name="connsiteX1" fmla="*/ 4736431 w 4736431"/>
+              <a:gd name="connsiteY1" fmla="*/ 562324 h 3367307"/>
+              <a:gd name="connsiteX2" fmla="*/ 4736431 w 4736431"/>
+              <a:gd name="connsiteY2" fmla="*/ 3367307 h 3367307"/>
+              <a:gd name="connsiteX3" fmla="*/ 1190042 w 4736431"/>
+              <a:gd name="connsiteY3" fmla="*/ 3367307 h 3367307"/>
+              <a:gd name="connsiteX4" fmla="*/ 287999 w 4736431"/>
+              <a:gd name="connsiteY4" fmla="*/ 1007167 h 3367307"/>
+              <a:gd name="connsiteX0" fmla="*/ 287999 w 5170290"/>
+              <a:gd name="connsiteY0" fmla="*/ 1007167 h 3367307"/>
+              <a:gd name="connsiteX1" fmla="*/ 4736431 w 5170290"/>
+              <a:gd name="connsiteY1" fmla="*/ 562324 h 3367307"/>
+              <a:gd name="connsiteX2" fmla="*/ 4736431 w 5170290"/>
+              <a:gd name="connsiteY2" fmla="*/ 3367307 h 3367307"/>
+              <a:gd name="connsiteX3" fmla="*/ 1190042 w 5170290"/>
+              <a:gd name="connsiteY3" fmla="*/ 3367307 h 3367307"/>
+              <a:gd name="connsiteX4" fmla="*/ 287999 w 5170290"/>
+              <a:gd name="connsiteY4" fmla="*/ 1007167 h 3367307"/>
+            </a:gdLst>
+            <a:ahLst/>
+            <a:cxnLst>
+              <a:cxn ang="0">
+                <a:pos x="connsiteX0" y="connsiteY0"/>
+              </a:cxn>
+              <a:cxn ang="0">
+                <a:pos x="connsiteX1" y="connsiteY1"/>
+              </a:cxn>
+              <a:cxn ang="0">
+                <a:pos x="connsiteX2" y="connsiteY2"/>
+              </a:cxn>
+              <a:cxn ang="0">
+                <a:pos x="connsiteX3" y="connsiteY3"/>
+              </a:cxn>
+              <a:cxn ang="0">
+                <a:pos x="connsiteX4" y="connsiteY4"/>
+              </a:cxn>
+            </a:cxnLst>
+            <a:rect l="l" t="t" r="r" b="b"/>
+            <a:pathLst>
+              <a:path w="5170290" h="3367307">
+                <a:moveTo>
+                  <a:pt x="287999" y="1007167"/>
+                </a:moveTo>
+                <a:cubicBezTo>
+                  <a:pt x="1770810" y="-6087"/>
+                  <a:pt x="3241263" y="-426216"/>
+                  <a:pt x="4736431" y="562324"/>
+                </a:cubicBezTo>
+                <a:cubicBezTo>
+                  <a:pt x="5712615" y="1979232"/>
+                  <a:pt x="4736431" y="2432313"/>
+                  <a:pt x="4736431" y="3367307"/>
+                </a:cubicBezTo>
+                <a:lnTo>
+                  <a:pt x="1190042" y="3367307"/>
+                </a:lnTo>
+                <a:cubicBezTo>
+                  <a:pt x="889361" y="2580594"/>
+                  <a:pt x="-622283" y="1670312"/>
+                  <a:pt x="287999" y="1007167"/>
+                </a:cubicBezTo>
+                <a:close/>
+              </a:path>
+            </a:pathLst>
+          </a:custGeom>
         </p:spPr>
         <p:style>
           <a:lnRef idx="2">
@@ -3942,10 +4129,10 @@
       </p:sp>
       <p:sp>
         <p:nvSpPr>
-          <p:cNvPr id="4" name=".id(lowres) details(hires, 6)">
-            <a:extLst>
-              <a:ext uri="{FF2B5EF4-FFF2-40B4-BE49-F238E27FC236}">
-                <a16:creationId xmlns:a16="http://schemas.microsoft.com/office/drawing/2014/main" id="{48E7D4F8-A9F2-FD43-98A2-9747CA640B90}"/>
+          <p:cNvPr id="5" name=".id(lowres3) details(hires, 9)">
+            <a:extLst>
+              <a:ext uri="{FF2B5EF4-FFF2-40B4-BE49-F238E27FC236}">
+                <a16:creationId xmlns:a16="http://schemas.microsoft.com/office/drawing/2014/main" id="{695506E5-B7A4-B84B-9B84-D8F9D4954122}"/>
               </a:ext>
             </a:extLst>
           </p:cNvPr>
@@ -3953,9 +4140,9 @@
           <p:nvPr/>
         </p:nvSpPr>
         <p:spPr>
-          <a:xfrm>
-            <a:off x="8044248" y="3863600"/>
-            <a:ext cx="650303" cy="387124"/>
+          <a:xfrm rot="17668932">
+            <a:off x="7557823" y="1939401"/>
+            <a:ext cx="56462" cy="45719"/>
           </a:xfrm>
           <a:custGeom>
             <a:avLst/>
@@ -4100,6 +4287,148 @@
               <a:gd name="connsiteY4" fmla="*/ 3965384 h 3965384"/>
               <a:gd name="connsiteX5" fmla="*/ 633621 w 6661173"/>
               <a:gd name="connsiteY5" fmla="*/ 97720 h 3965384"/>
+              <a:gd name="connsiteX0" fmla="*/ 633621 w 6661173"/>
+              <a:gd name="connsiteY0" fmla="*/ 1219541 h 5087205"/>
+              <a:gd name="connsiteX1" fmla="*/ 3638074 w 6661173"/>
+              <a:gd name="connsiteY1" fmla="*/ 45649 h 5087205"/>
+              <a:gd name="connsiteX2" fmla="*/ 6169447 w 6661173"/>
+              <a:gd name="connsiteY2" fmla="*/ 1219541 h 5087205"/>
+              <a:gd name="connsiteX3" fmla="*/ 6305371 w 6661173"/>
+              <a:gd name="connsiteY3" fmla="*/ 4852427 h 5087205"/>
+              <a:gd name="connsiteX4" fmla="*/ 139350 w 6661173"/>
+              <a:gd name="connsiteY4" fmla="*/ 5087205 h 5087205"/>
+              <a:gd name="connsiteX5" fmla="*/ 633621 w 6661173"/>
+              <a:gd name="connsiteY5" fmla="*/ 1219541 h 5087205"/>
+              <a:gd name="connsiteX0" fmla="*/ 633621 w 6661173"/>
+              <a:gd name="connsiteY0" fmla="*/ 1368268 h 5235932"/>
+              <a:gd name="connsiteX1" fmla="*/ 3638074 w 6661173"/>
+              <a:gd name="connsiteY1" fmla="*/ 194376 h 5235932"/>
+              <a:gd name="connsiteX2" fmla="*/ 6169447 w 6661173"/>
+              <a:gd name="connsiteY2" fmla="*/ 1368268 h 5235932"/>
+              <a:gd name="connsiteX3" fmla="*/ 6305371 w 6661173"/>
+              <a:gd name="connsiteY3" fmla="*/ 5001154 h 5235932"/>
+              <a:gd name="connsiteX4" fmla="*/ 139350 w 6661173"/>
+              <a:gd name="connsiteY4" fmla="*/ 5235932 h 5235932"/>
+              <a:gd name="connsiteX5" fmla="*/ 633621 w 6661173"/>
+              <a:gd name="connsiteY5" fmla="*/ 1368268 h 5235932"/>
+              <a:gd name="connsiteX0" fmla="*/ 633621 w 6661173"/>
+              <a:gd name="connsiteY0" fmla="*/ 857602 h 4725266"/>
+              <a:gd name="connsiteX1" fmla="*/ 3613062 w 6661173"/>
+              <a:gd name="connsiteY1" fmla="*/ 252120 h 4725266"/>
+              <a:gd name="connsiteX2" fmla="*/ 6169447 w 6661173"/>
+              <a:gd name="connsiteY2" fmla="*/ 857602 h 4725266"/>
+              <a:gd name="connsiteX3" fmla="*/ 6305371 w 6661173"/>
+              <a:gd name="connsiteY3" fmla="*/ 4490488 h 4725266"/>
+              <a:gd name="connsiteX4" fmla="*/ 139350 w 6661173"/>
+              <a:gd name="connsiteY4" fmla="*/ 4725266 h 4725266"/>
+              <a:gd name="connsiteX5" fmla="*/ 633621 w 6661173"/>
+              <a:gd name="connsiteY5" fmla="*/ 857602 h 4725266"/>
+              <a:gd name="connsiteX0" fmla="*/ 633621 w 6661173"/>
+              <a:gd name="connsiteY0" fmla="*/ 1003890 h 4871554"/>
+              <a:gd name="connsiteX1" fmla="*/ 3613062 w 6661173"/>
+              <a:gd name="connsiteY1" fmla="*/ 398408 h 4871554"/>
+              <a:gd name="connsiteX2" fmla="*/ 6169447 w 6661173"/>
+              <a:gd name="connsiteY2" fmla="*/ 1003890 h 4871554"/>
+              <a:gd name="connsiteX3" fmla="*/ 6305371 w 6661173"/>
+              <a:gd name="connsiteY3" fmla="*/ 4636776 h 4871554"/>
+              <a:gd name="connsiteX4" fmla="*/ 139350 w 6661173"/>
+              <a:gd name="connsiteY4" fmla="*/ 4871554 h 4871554"/>
+              <a:gd name="connsiteX5" fmla="*/ 633621 w 6661173"/>
+              <a:gd name="connsiteY5" fmla="*/ 1003890 h 4871554"/>
+              <a:gd name="connsiteX0" fmla="*/ 633621 w 6661173"/>
+              <a:gd name="connsiteY0" fmla="*/ 1022408 h 4890072"/>
+              <a:gd name="connsiteX1" fmla="*/ 3613062 w 6661173"/>
+              <a:gd name="connsiteY1" fmla="*/ 416926 h 4890072"/>
+              <a:gd name="connsiteX2" fmla="*/ 6169447 w 6661173"/>
+              <a:gd name="connsiteY2" fmla="*/ 1022408 h 4890072"/>
+              <a:gd name="connsiteX3" fmla="*/ 6305371 w 6661173"/>
+              <a:gd name="connsiteY3" fmla="*/ 4655294 h 4890072"/>
+              <a:gd name="connsiteX4" fmla="*/ 139350 w 6661173"/>
+              <a:gd name="connsiteY4" fmla="*/ 4890072 h 4890072"/>
+              <a:gd name="connsiteX5" fmla="*/ 633621 w 6661173"/>
+              <a:gd name="connsiteY5" fmla="*/ 1022408 h 4890072"/>
+              <a:gd name="connsiteX0" fmla="*/ 633621 w 6661173"/>
+              <a:gd name="connsiteY0" fmla="*/ 819066 h 4686730"/>
+              <a:gd name="connsiteX1" fmla="*/ 3450480 w 6661173"/>
+              <a:gd name="connsiteY1" fmla="*/ 460719 h 4686730"/>
+              <a:gd name="connsiteX2" fmla="*/ 6169447 w 6661173"/>
+              <a:gd name="connsiteY2" fmla="*/ 819066 h 4686730"/>
+              <a:gd name="connsiteX3" fmla="*/ 6305371 w 6661173"/>
+              <a:gd name="connsiteY3" fmla="*/ 4451952 h 4686730"/>
+              <a:gd name="connsiteX4" fmla="*/ 139350 w 6661173"/>
+              <a:gd name="connsiteY4" fmla="*/ 4686730 h 4686730"/>
+              <a:gd name="connsiteX5" fmla="*/ 633621 w 6661173"/>
+              <a:gd name="connsiteY5" fmla="*/ 819066 h 4686730"/>
+              <a:gd name="connsiteX0" fmla="*/ 633621 w 6661173"/>
+              <a:gd name="connsiteY0" fmla="*/ 819066 h 5168644"/>
+              <a:gd name="connsiteX1" fmla="*/ 3450480 w 6661173"/>
+              <a:gd name="connsiteY1" fmla="*/ 460719 h 5168644"/>
+              <a:gd name="connsiteX2" fmla="*/ 6169447 w 6661173"/>
+              <a:gd name="connsiteY2" fmla="*/ 819066 h 5168644"/>
+              <a:gd name="connsiteX3" fmla="*/ 6305371 w 6661173"/>
+              <a:gd name="connsiteY3" fmla="*/ 4451952 h 5168644"/>
+              <a:gd name="connsiteX4" fmla="*/ 3251626 w 6661173"/>
+              <a:gd name="connsiteY4" fmla="*/ 5168644 h 5168644"/>
+              <a:gd name="connsiteX5" fmla="*/ 139350 w 6661173"/>
+              <a:gd name="connsiteY5" fmla="*/ 4686730 h 5168644"/>
+              <a:gd name="connsiteX6" fmla="*/ 633621 w 6661173"/>
+              <a:gd name="connsiteY6" fmla="*/ 819066 h 5168644"/>
+              <a:gd name="connsiteX0" fmla="*/ 633621 w 6661173"/>
+              <a:gd name="connsiteY0" fmla="*/ 819066 h 5168644"/>
+              <a:gd name="connsiteX1" fmla="*/ 3450480 w 6661173"/>
+              <a:gd name="connsiteY1" fmla="*/ 460719 h 5168644"/>
+              <a:gd name="connsiteX2" fmla="*/ 6169447 w 6661173"/>
+              <a:gd name="connsiteY2" fmla="*/ 819066 h 5168644"/>
+              <a:gd name="connsiteX3" fmla="*/ 6305371 w 6661173"/>
+              <a:gd name="connsiteY3" fmla="*/ 4451952 h 5168644"/>
+              <a:gd name="connsiteX4" fmla="*/ 3251626 w 6661173"/>
+              <a:gd name="connsiteY4" fmla="*/ 5168644 h 5168644"/>
+              <a:gd name="connsiteX5" fmla="*/ 139350 w 6661173"/>
+              <a:gd name="connsiteY5" fmla="*/ 4686730 h 5168644"/>
+              <a:gd name="connsiteX6" fmla="*/ 633621 w 6661173"/>
+              <a:gd name="connsiteY6" fmla="*/ 819066 h 5168644"/>
+              <a:gd name="connsiteX0" fmla="*/ 633621 w 6661173"/>
+              <a:gd name="connsiteY0" fmla="*/ 819066 h 5168644"/>
+              <a:gd name="connsiteX1" fmla="*/ 3450480 w 6661173"/>
+              <a:gd name="connsiteY1" fmla="*/ 460719 h 5168644"/>
+              <a:gd name="connsiteX2" fmla="*/ 6169447 w 6661173"/>
+              <a:gd name="connsiteY2" fmla="*/ 819066 h 5168644"/>
+              <a:gd name="connsiteX3" fmla="*/ 6305371 w 6661173"/>
+              <a:gd name="connsiteY3" fmla="*/ 4451952 h 5168644"/>
+              <a:gd name="connsiteX4" fmla="*/ 3251626 w 6661173"/>
+              <a:gd name="connsiteY4" fmla="*/ 5168644 h 5168644"/>
+              <a:gd name="connsiteX5" fmla="*/ 139350 w 6661173"/>
+              <a:gd name="connsiteY5" fmla="*/ 4686730 h 5168644"/>
+              <a:gd name="connsiteX6" fmla="*/ 633621 w 6661173"/>
+              <a:gd name="connsiteY6" fmla="*/ 819066 h 5168644"/>
+              <a:gd name="connsiteX0" fmla="*/ 633621 w 6661173"/>
+              <a:gd name="connsiteY0" fmla="*/ 819066 h 5329281"/>
+              <a:gd name="connsiteX1" fmla="*/ 3450480 w 6661173"/>
+              <a:gd name="connsiteY1" fmla="*/ 460719 h 5329281"/>
+              <a:gd name="connsiteX2" fmla="*/ 6169447 w 6661173"/>
+              <a:gd name="connsiteY2" fmla="*/ 819066 h 5329281"/>
+              <a:gd name="connsiteX3" fmla="*/ 6305371 w 6661173"/>
+              <a:gd name="connsiteY3" fmla="*/ 4451952 h 5329281"/>
+              <a:gd name="connsiteX4" fmla="*/ 4164582 w 6661173"/>
+              <a:gd name="connsiteY4" fmla="*/ 5329281 h 5329281"/>
+              <a:gd name="connsiteX5" fmla="*/ 139350 w 6661173"/>
+              <a:gd name="connsiteY5" fmla="*/ 4686730 h 5329281"/>
+              <a:gd name="connsiteX6" fmla="*/ 633621 w 6661173"/>
+              <a:gd name="connsiteY6" fmla="*/ 819066 h 5329281"/>
+              <a:gd name="connsiteX0" fmla="*/ 633621 w 6661173"/>
+              <a:gd name="connsiteY0" fmla="*/ 819066 h 5329281"/>
+              <a:gd name="connsiteX1" fmla="*/ 3450480 w 6661173"/>
+              <a:gd name="connsiteY1" fmla="*/ 460719 h 5329281"/>
+              <a:gd name="connsiteX2" fmla="*/ 6169447 w 6661173"/>
+              <a:gd name="connsiteY2" fmla="*/ 819066 h 5329281"/>
+              <a:gd name="connsiteX3" fmla="*/ 6305371 w 6661173"/>
+              <a:gd name="connsiteY3" fmla="*/ 4451952 h 5329281"/>
+              <a:gd name="connsiteX4" fmla="*/ 4164582 w 6661173"/>
+              <a:gd name="connsiteY4" fmla="*/ 5329281 h 5329281"/>
+              <a:gd name="connsiteX5" fmla="*/ 139350 w 6661173"/>
+              <a:gd name="connsiteY5" fmla="*/ 4686730 h 5329281"/>
+              <a:gd name="connsiteX6" fmla="*/ 633621 w 6661173"/>
+              <a:gd name="connsiteY6" fmla="*/ 819066 h 5329281"/>
             </a:gdLst>
             <a:ahLst/>
             <a:cxnLst>
@@ -4121,35 +4450,45 @@
               <a:cxn ang="0">
                 <a:pos x="connsiteX5" y="connsiteY5"/>
               </a:cxn>
+              <a:cxn ang="0">
+                <a:pos x="connsiteX6" y="connsiteY6"/>
+              </a:cxn>
             </a:cxnLst>
             <a:rect l="l" t="t" r="r" b="b"/>
             <a:pathLst>
-              <a:path w="6661173" h="3965384">
+              <a:path w="6661173" h="5329281">
                 <a:moveTo>
-                  <a:pt x="633621" y="97720"/>
+                  <a:pt x="633621" y="819066"/>
                 </a:moveTo>
                 <a:cubicBezTo>
-                  <a:pt x="1688751" y="44174"/>
-                  <a:pt x="1174572" y="-132941"/>
-                  <a:pt x="3663086" y="184217"/>
+                  <a:pt x="1688751" y="765520"/>
+                  <a:pt x="3213093" y="-733768"/>
+                  <a:pt x="3450480" y="460719"/>
                 </a:cubicBezTo>
                 <a:cubicBezTo>
-                  <a:pt x="5487080" y="-104107"/>
-                  <a:pt x="5333993" y="126552"/>
-                  <a:pt x="6169447" y="97720"/>
+                  <a:pt x="3948812" y="-717291"/>
+                  <a:pt x="5333993" y="847898"/>
+                  <a:pt x="6169447" y="819066"/>
                 </a:cubicBezTo>
                 <a:cubicBezTo>
-                  <a:pt x="7215653" y="591991"/>
-                  <a:pt x="6260063" y="2519644"/>
-                  <a:pt x="6305371" y="3730606"/>
+                  <a:pt x="7215653" y="1313337"/>
+                  <a:pt x="6260063" y="3240990"/>
+                  <a:pt x="6305371" y="4451952"/>
                 </a:cubicBezTo>
-                <a:lnTo>
-                  <a:pt x="139350" y="3965384"/>
-                </a:lnTo>
                 <a:cubicBezTo>
-                  <a:pt x="-313731" y="2688520"/>
-                  <a:pt x="468864" y="1386941"/>
-                  <a:pt x="633621" y="97720"/>
+                  <a:pt x="5308300" y="4489022"/>
+                  <a:pt x="4761453" y="4414882"/>
+                  <a:pt x="4164582" y="5329281"/>
+                </a:cubicBezTo>
+                <a:cubicBezTo>
+                  <a:pt x="3815001" y="4600232"/>
+                  <a:pt x="1176775" y="4847368"/>
+                  <a:pt x="139350" y="4686730"/>
+                </a:cubicBezTo>
+                <a:cubicBezTo>
+                  <a:pt x="-313731" y="3409866"/>
+                  <a:pt x="468864" y="2108287"/>
+                  <a:pt x="633621" y="819066"/>
                 </a:cubicBezTo>
                 <a:close/>
               </a:path>
@@ -4158,6 +4497,7 @@
           <a:solidFill>
             <a:srgbClr val="FFC000"/>
           </a:solidFill>
+          <a:ln w="3175"/>
         </p:spPr>
         <p:style>
           <a:lnRef idx="2">
@@ -4180,16 +4520,16 @@
           <a:lstStyle/>
           <a:p>
             <a:pPr algn="ctr"/>
-            <a:endParaRPr lang="en-US"/>
-          </a:p>
-        </p:txBody>
-      </p:sp>
-      <p:sp>
-        <p:nvSpPr>
-          <p:cNvPr id="9" name=".id(l1)">
-            <a:extLst>
-              <a:ext uri="{FF2B5EF4-FFF2-40B4-BE49-F238E27FC236}">
-                <a16:creationId xmlns:a16="http://schemas.microsoft.com/office/drawing/2014/main" id="{6591EE5B-DEB6-EE4E-8A61-5BC895FBFEF1}"/>
+            <a:endParaRPr lang="en-US" dirty="0"/>
+          </a:p>
+        </p:txBody>
+      </p:sp>
+      <p:sp>
+        <p:nvSpPr>
+          <p:cNvPr id="6" name=".id(lowres2) details(hires, 9)">
+            <a:extLst>
+              <a:ext uri="{FF2B5EF4-FFF2-40B4-BE49-F238E27FC236}">
+                <a16:creationId xmlns:a16="http://schemas.microsoft.com/office/drawing/2014/main" id="{26552CFB-5A88-F542-9933-DB59B5D51439}"/>
               </a:ext>
             </a:extLst>
           </p:cNvPr>
@@ -4197,149 +4537,9 @@
           <p:nvPr/>
         </p:nvSpPr>
         <p:spPr>
-          <a:xfrm>
-            <a:off x="7599405" y="1729946"/>
-            <a:ext cx="914400" cy="2133654"/>
-          </a:xfrm>
-          <a:custGeom>
-            <a:avLst/>
-            <a:gdLst>
-              <a:gd name="connsiteX0" fmla="*/ 0 w 889687"/>
-              <a:gd name="connsiteY0" fmla="*/ 0 h 2187146"/>
-              <a:gd name="connsiteX1" fmla="*/ 803190 w 889687"/>
-              <a:gd name="connsiteY1" fmla="*/ 729049 h 2187146"/>
-              <a:gd name="connsiteX2" fmla="*/ 803190 w 889687"/>
-              <a:gd name="connsiteY2" fmla="*/ 1309816 h 2187146"/>
-              <a:gd name="connsiteX3" fmla="*/ 580768 w 889687"/>
-              <a:gd name="connsiteY3" fmla="*/ 1668162 h 2187146"/>
-              <a:gd name="connsiteX4" fmla="*/ 889687 w 889687"/>
-              <a:gd name="connsiteY4" fmla="*/ 2187146 h 2187146"/>
-            </a:gdLst>
-            <a:ahLst/>
-            <a:cxnLst>
-              <a:cxn ang="0">
-                <a:pos x="connsiteX0" y="connsiteY0"/>
-              </a:cxn>
-              <a:cxn ang="0">
-                <a:pos x="connsiteX1" y="connsiteY1"/>
-              </a:cxn>
-              <a:cxn ang="0">
-                <a:pos x="connsiteX2" y="connsiteY2"/>
-              </a:cxn>
-              <a:cxn ang="0">
-                <a:pos x="connsiteX3" y="connsiteY3"/>
-              </a:cxn>
-              <a:cxn ang="0">
-                <a:pos x="connsiteX4" y="connsiteY4"/>
-              </a:cxn>
-            </a:cxnLst>
-            <a:rect l="l" t="t" r="r" b="b"/>
-            <a:pathLst>
-              <a:path w="889687" h="2187146">
-                <a:moveTo>
-                  <a:pt x="0" y="0"/>
-                </a:moveTo>
-                <a:cubicBezTo>
-                  <a:pt x="334662" y="255373"/>
-                  <a:pt x="669325" y="510746"/>
-                  <a:pt x="803190" y="729049"/>
-                </a:cubicBezTo>
-                <a:cubicBezTo>
-                  <a:pt x="937055" y="947352"/>
-                  <a:pt x="840260" y="1153297"/>
-                  <a:pt x="803190" y="1309816"/>
-                </a:cubicBezTo>
-                <a:cubicBezTo>
-                  <a:pt x="766120" y="1466335"/>
-                  <a:pt x="566352" y="1521940"/>
-                  <a:pt x="580768" y="1668162"/>
-                </a:cubicBezTo>
-                <a:cubicBezTo>
-                  <a:pt x="595184" y="1814384"/>
-                  <a:pt x="742435" y="2000765"/>
-                  <a:pt x="889687" y="2187146"/>
-                </a:cubicBezTo>
-              </a:path>
-            </a:pathLst>
-          </a:custGeom>
-          <a:noFill/>
-          <a:ln w="15875">
-            <a:solidFill>
-              <a:srgbClr val="FF0000"/>
-            </a:solidFill>
-          </a:ln>
-        </p:spPr>
-        <p:style>
-          <a:lnRef idx="2">
-            <a:schemeClr val="accent1">
-              <a:shade val="50000"/>
-            </a:schemeClr>
-          </a:lnRef>
-          <a:fillRef idx="1">
-            <a:schemeClr val="accent1"/>
-          </a:fillRef>
-          <a:effectRef idx="0">
-            <a:schemeClr val="accent1"/>
-          </a:effectRef>
-          <a:fontRef idx="minor">
-            <a:schemeClr val="lt1"/>
-          </a:fontRef>
-        </p:style>
-        <p:txBody>
-          <a:bodyPr rtlCol="0" anchor="ctr"/>
-          <a:lstStyle/>
-          <a:p>
-            <a:pPr algn="ctr"/>
-            <a:endParaRPr lang="en-US"/>
-          </a:p>
-        </p:txBody>
-      </p:sp>
-    </p:spTree>
-    <p:extLst>
-      <p:ext uri="{BB962C8B-B14F-4D97-AF65-F5344CB8AC3E}">
-        <p14:creationId xmlns:p14="http://schemas.microsoft.com/office/powerpoint/2010/main" val="1382586919"/>
-      </p:ext>
-    </p:extLst>
-  </p:cSld>
-  <p:clrMapOvr>
-    <a:masterClrMapping/>
-  </p:clrMapOvr>
-</p:sld>
-</file>
-
-<file path=ppt/slides/slide2.xml><?xml version="1.0" encoding="utf-8"?>
-<p:sld xmlns:a="http://schemas.openxmlformats.org/drawingml/2006/main" xmlns:r="http://schemas.openxmlformats.org/officeDocument/2006/relationships" xmlns:p="http://schemas.openxmlformats.org/presentationml/2006/main">
-  <p:cSld>
-    <p:spTree>
-      <p:nvGrpSpPr>
-        <p:cNvPr id="1" name=""/>
-        <p:cNvGrpSpPr/>
-        <p:nvPr/>
-      </p:nvGrpSpPr>
-      <p:grpSpPr>
-        <a:xfrm>
-          <a:off x="0" y="0"/>
-          <a:ext cx="0" cy="0"/>
-          <a:chOff x="0" y="0"/>
-          <a:chExt cx="0" cy="0"/>
-        </a:xfrm>
-      </p:grpSpPr>
-      <p:sp>
-        <p:nvSpPr>
-          <p:cNvPr id="2" name=".id(a1)">
-            <a:extLst>
-              <a:ext uri="{FF2B5EF4-FFF2-40B4-BE49-F238E27FC236}">
-                <a16:creationId xmlns:a16="http://schemas.microsoft.com/office/drawing/2014/main" id="{1B7FAEA9-0041-CB42-B702-9A340BA6E54F}"/>
-              </a:ext>
-            </a:extLst>
-          </p:cNvPr>
-          <p:cNvSpPr/>
-          <p:nvPr/>
-        </p:nvSpPr>
-        <p:spPr>
-          <a:xfrm>
-            <a:off x="2811855" y="1768152"/>
-            <a:ext cx="6661173" cy="3965384"/>
+          <a:xfrm rot="1264211">
+            <a:off x="7376513" y="1903102"/>
+            <a:ext cx="61467" cy="49772"/>
           </a:xfrm>
           <a:custGeom>
             <a:avLst/>
@@ -4484,6 +4684,148 @@
               <a:gd name="connsiteY4" fmla="*/ 3965384 h 3965384"/>
               <a:gd name="connsiteX5" fmla="*/ 633621 w 6661173"/>
               <a:gd name="connsiteY5" fmla="*/ 97720 h 3965384"/>
+              <a:gd name="connsiteX0" fmla="*/ 633621 w 6661173"/>
+              <a:gd name="connsiteY0" fmla="*/ 1219541 h 5087205"/>
+              <a:gd name="connsiteX1" fmla="*/ 3638074 w 6661173"/>
+              <a:gd name="connsiteY1" fmla="*/ 45649 h 5087205"/>
+              <a:gd name="connsiteX2" fmla="*/ 6169447 w 6661173"/>
+              <a:gd name="connsiteY2" fmla="*/ 1219541 h 5087205"/>
+              <a:gd name="connsiteX3" fmla="*/ 6305371 w 6661173"/>
+              <a:gd name="connsiteY3" fmla="*/ 4852427 h 5087205"/>
+              <a:gd name="connsiteX4" fmla="*/ 139350 w 6661173"/>
+              <a:gd name="connsiteY4" fmla="*/ 5087205 h 5087205"/>
+              <a:gd name="connsiteX5" fmla="*/ 633621 w 6661173"/>
+              <a:gd name="connsiteY5" fmla="*/ 1219541 h 5087205"/>
+              <a:gd name="connsiteX0" fmla="*/ 633621 w 6661173"/>
+              <a:gd name="connsiteY0" fmla="*/ 1368268 h 5235932"/>
+              <a:gd name="connsiteX1" fmla="*/ 3638074 w 6661173"/>
+              <a:gd name="connsiteY1" fmla="*/ 194376 h 5235932"/>
+              <a:gd name="connsiteX2" fmla="*/ 6169447 w 6661173"/>
+              <a:gd name="connsiteY2" fmla="*/ 1368268 h 5235932"/>
+              <a:gd name="connsiteX3" fmla="*/ 6305371 w 6661173"/>
+              <a:gd name="connsiteY3" fmla="*/ 5001154 h 5235932"/>
+              <a:gd name="connsiteX4" fmla="*/ 139350 w 6661173"/>
+              <a:gd name="connsiteY4" fmla="*/ 5235932 h 5235932"/>
+              <a:gd name="connsiteX5" fmla="*/ 633621 w 6661173"/>
+              <a:gd name="connsiteY5" fmla="*/ 1368268 h 5235932"/>
+              <a:gd name="connsiteX0" fmla="*/ 633621 w 6661173"/>
+              <a:gd name="connsiteY0" fmla="*/ 857602 h 4725266"/>
+              <a:gd name="connsiteX1" fmla="*/ 3613062 w 6661173"/>
+              <a:gd name="connsiteY1" fmla="*/ 252120 h 4725266"/>
+              <a:gd name="connsiteX2" fmla="*/ 6169447 w 6661173"/>
+              <a:gd name="connsiteY2" fmla="*/ 857602 h 4725266"/>
+              <a:gd name="connsiteX3" fmla="*/ 6305371 w 6661173"/>
+              <a:gd name="connsiteY3" fmla="*/ 4490488 h 4725266"/>
+              <a:gd name="connsiteX4" fmla="*/ 139350 w 6661173"/>
+              <a:gd name="connsiteY4" fmla="*/ 4725266 h 4725266"/>
+              <a:gd name="connsiteX5" fmla="*/ 633621 w 6661173"/>
+              <a:gd name="connsiteY5" fmla="*/ 857602 h 4725266"/>
+              <a:gd name="connsiteX0" fmla="*/ 633621 w 6661173"/>
+              <a:gd name="connsiteY0" fmla="*/ 1003890 h 4871554"/>
+              <a:gd name="connsiteX1" fmla="*/ 3613062 w 6661173"/>
+              <a:gd name="connsiteY1" fmla="*/ 398408 h 4871554"/>
+              <a:gd name="connsiteX2" fmla="*/ 6169447 w 6661173"/>
+              <a:gd name="connsiteY2" fmla="*/ 1003890 h 4871554"/>
+              <a:gd name="connsiteX3" fmla="*/ 6305371 w 6661173"/>
+              <a:gd name="connsiteY3" fmla="*/ 4636776 h 4871554"/>
+              <a:gd name="connsiteX4" fmla="*/ 139350 w 6661173"/>
+              <a:gd name="connsiteY4" fmla="*/ 4871554 h 4871554"/>
+              <a:gd name="connsiteX5" fmla="*/ 633621 w 6661173"/>
+              <a:gd name="connsiteY5" fmla="*/ 1003890 h 4871554"/>
+              <a:gd name="connsiteX0" fmla="*/ 633621 w 6661173"/>
+              <a:gd name="connsiteY0" fmla="*/ 1022408 h 4890072"/>
+              <a:gd name="connsiteX1" fmla="*/ 3613062 w 6661173"/>
+              <a:gd name="connsiteY1" fmla="*/ 416926 h 4890072"/>
+              <a:gd name="connsiteX2" fmla="*/ 6169447 w 6661173"/>
+              <a:gd name="connsiteY2" fmla="*/ 1022408 h 4890072"/>
+              <a:gd name="connsiteX3" fmla="*/ 6305371 w 6661173"/>
+              <a:gd name="connsiteY3" fmla="*/ 4655294 h 4890072"/>
+              <a:gd name="connsiteX4" fmla="*/ 139350 w 6661173"/>
+              <a:gd name="connsiteY4" fmla="*/ 4890072 h 4890072"/>
+              <a:gd name="connsiteX5" fmla="*/ 633621 w 6661173"/>
+              <a:gd name="connsiteY5" fmla="*/ 1022408 h 4890072"/>
+              <a:gd name="connsiteX0" fmla="*/ 633621 w 6661173"/>
+              <a:gd name="connsiteY0" fmla="*/ 819066 h 4686730"/>
+              <a:gd name="connsiteX1" fmla="*/ 3450480 w 6661173"/>
+              <a:gd name="connsiteY1" fmla="*/ 460719 h 4686730"/>
+              <a:gd name="connsiteX2" fmla="*/ 6169447 w 6661173"/>
+              <a:gd name="connsiteY2" fmla="*/ 819066 h 4686730"/>
+              <a:gd name="connsiteX3" fmla="*/ 6305371 w 6661173"/>
+              <a:gd name="connsiteY3" fmla="*/ 4451952 h 4686730"/>
+              <a:gd name="connsiteX4" fmla="*/ 139350 w 6661173"/>
+              <a:gd name="connsiteY4" fmla="*/ 4686730 h 4686730"/>
+              <a:gd name="connsiteX5" fmla="*/ 633621 w 6661173"/>
+              <a:gd name="connsiteY5" fmla="*/ 819066 h 4686730"/>
+              <a:gd name="connsiteX0" fmla="*/ 633621 w 6661173"/>
+              <a:gd name="connsiteY0" fmla="*/ 819066 h 5168644"/>
+              <a:gd name="connsiteX1" fmla="*/ 3450480 w 6661173"/>
+              <a:gd name="connsiteY1" fmla="*/ 460719 h 5168644"/>
+              <a:gd name="connsiteX2" fmla="*/ 6169447 w 6661173"/>
+              <a:gd name="connsiteY2" fmla="*/ 819066 h 5168644"/>
+              <a:gd name="connsiteX3" fmla="*/ 6305371 w 6661173"/>
+              <a:gd name="connsiteY3" fmla="*/ 4451952 h 5168644"/>
+              <a:gd name="connsiteX4" fmla="*/ 3251626 w 6661173"/>
+              <a:gd name="connsiteY4" fmla="*/ 5168644 h 5168644"/>
+              <a:gd name="connsiteX5" fmla="*/ 139350 w 6661173"/>
+              <a:gd name="connsiteY5" fmla="*/ 4686730 h 5168644"/>
+              <a:gd name="connsiteX6" fmla="*/ 633621 w 6661173"/>
+              <a:gd name="connsiteY6" fmla="*/ 819066 h 5168644"/>
+              <a:gd name="connsiteX0" fmla="*/ 633621 w 6661173"/>
+              <a:gd name="connsiteY0" fmla="*/ 819066 h 5168644"/>
+              <a:gd name="connsiteX1" fmla="*/ 3450480 w 6661173"/>
+              <a:gd name="connsiteY1" fmla="*/ 460719 h 5168644"/>
+              <a:gd name="connsiteX2" fmla="*/ 6169447 w 6661173"/>
+              <a:gd name="connsiteY2" fmla="*/ 819066 h 5168644"/>
+              <a:gd name="connsiteX3" fmla="*/ 6305371 w 6661173"/>
+              <a:gd name="connsiteY3" fmla="*/ 4451952 h 5168644"/>
+              <a:gd name="connsiteX4" fmla="*/ 3251626 w 6661173"/>
+              <a:gd name="connsiteY4" fmla="*/ 5168644 h 5168644"/>
+              <a:gd name="connsiteX5" fmla="*/ 139350 w 6661173"/>
+              <a:gd name="connsiteY5" fmla="*/ 4686730 h 5168644"/>
+              <a:gd name="connsiteX6" fmla="*/ 633621 w 6661173"/>
+              <a:gd name="connsiteY6" fmla="*/ 819066 h 5168644"/>
+              <a:gd name="connsiteX0" fmla="*/ 633621 w 6661173"/>
+              <a:gd name="connsiteY0" fmla="*/ 819066 h 5168644"/>
+              <a:gd name="connsiteX1" fmla="*/ 3450480 w 6661173"/>
+              <a:gd name="connsiteY1" fmla="*/ 460719 h 5168644"/>
+              <a:gd name="connsiteX2" fmla="*/ 6169447 w 6661173"/>
+              <a:gd name="connsiteY2" fmla="*/ 819066 h 5168644"/>
+              <a:gd name="connsiteX3" fmla="*/ 6305371 w 6661173"/>
+              <a:gd name="connsiteY3" fmla="*/ 4451952 h 5168644"/>
+              <a:gd name="connsiteX4" fmla="*/ 3251626 w 6661173"/>
+              <a:gd name="connsiteY4" fmla="*/ 5168644 h 5168644"/>
+              <a:gd name="connsiteX5" fmla="*/ 139350 w 6661173"/>
+              <a:gd name="connsiteY5" fmla="*/ 4686730 h 5168644"/>
+              <a:gd name="connsiteX6" fmla="*/ 633621 w 6661173"/>
+              <a:gd name="connsiteY6" fmla="*/ 819066 h 5168644"/>
+              <a:gd name="connsiteX0" fmla="*/ 633621 w 6661173"/>
+              <a:gd name="connsiteY0" fmla="*/ 819066 h 5329281"/>
+              <a:gd name="connsiteX1" fmla="*/ 3450480 w 6661173"/>
+              <a:gd name="connsiteY1" fmla="*/ 460719 h 5329281"/>
+              <a:gd name="connsiteX2" fmla="*/ 6169447 w 6661173"/>
+              <a:gd name="connsiteY2" fmla="*/ 819066 h 5329281"/>
+              <a:gd name="connsiteX3" fmla="*/ 6305371 w 6661173"/>
+              <a:gd name="connsiteY3" fmla="*/ 4451952 h 5329281"/>
+              <a:gd name="connsiteX4" fmla="*/ 4164582 w 6661173"/>
+              <a:gd name="connsiteY4" fmla="*/ 5329281 h 5329281"/>
+              <a:gd name="connsiteX5" fmla="*/ 139350 w 6661173"/>
+              <a:gd name="connsiteY5" fmla="*/ 4686730 h 5329281"/>
+              <a:gd name="connsiteX6" fmla="*/ 633621 w 6661173"/>
+              <a:gd name="connsiteY6" fmla="*/ 819066 h 5329281"/>
+              <a:gd name="connsiteX0" fmla="*/ 633621 w 6661173"/>
+              <a:gd name="connsiteY0" fmla="*/ 819066 h 5329281"/>
+              <a:gd name="connsiteX1" fmla="*/ 3450480 w 6661173"/>
+              <a:gd name="connsiteY1" fmla="*/ 460719 h 5329281"/>
+              <a:gd name="connsiteX2" fmla="*/ 6169447 w 6661173"/>
+              <a:gd name="connsiteY2" fmla="*/ 819066 h 5329281"/>
+              <a:gd name="connsiteX3" fmla="*/ 6305371 w 6661173"/>
+              <a:gd name="connsiteY3" fmla="*/ 4451952 h 5329281"/>
+              <a:gd name="connsiteX4" fmla="*/ 4164582 w 6661173"/>
+              <a:gd name="connsiteY4" fmla="*/ 5329281 h 5329281"/>
+              <a:gd name="connsiteX5" fmla="*/ 139350 w 6661173"/>
+              <a:gd name="connsiteY5" fmla="*/ 4686730 h 5329281"/>
+              <a:gd name="connsiteX6" fmla="*/ 633621 w 6661173"/>
+              <a:gd name="connsiteY6" fmla="*/ 819066 h 5329281"/>
             </a:gdLst>
             <a:ahLst/>
             <a:cxnLst>
@@ -4505,35 +4847,869 @@
               <a:cxn ang="0">
                 <a:pos x="connsiteX5" y="connsiteY5"/>
               </a:cxn>
+              <a:cxn ang="0">
+                <a:pos x="connsiteX6" y="connsiteY6"/>
+              </a:cxn>
             </a:cxnLst>
             <a:rect l="l" t="t" r="r" b="b"/>
             <a:pathLst>
-              <a:path w="6661173" h="3965384">
+              <a:path w="6661173" h="5329281">
                 <a:moveTo>
-                  <a:pt x="633621" y="97720"/>
+                  <a:pt x="633621" y="819066"/>
                 </a:moveTo>
                 <a:cubicBezTo>
-                  <a:pt x="1688751" y="44174"/>
-                  <a:pt x="1174572" y="-132941"/>
-                  <a:pt x="3663086" y="184217"/>
+                  <a:pt x="1688751" y="765520"/>
+                  <a:pt x="3213093" y="-733768"/>
+                  <a:pt x="3450480" y="460719"/>
                 </a:cubicBezTo>
                 <a:cubicBezTo>
-                  <a:pt x="5487080" y="-104107"/>
-                  <a:pt x="5333993" y="126552"/>
-                  <a:pt x="6169447" y="97720"/>
+                  <a:pt x="3948812" y="-717291"/>
+                  <a:pt x="5333993" y="847898"/>
+                  <a:pt x="6169447" y="819066"/>
                 </a:cubicBezTo>
                 <a:cubicBezTo>
-                  <a:pt x="7215653" y="591991"/>
-                  <a:pt x="6260063" y="2519644"/>
-                  <a:pt x="6305371" y="3730606"/>
+                  <a:pt x="7215653" y="1313337"/>
+                  <a:pt x="6260063" y="3240990"/>
+                  <a:pt x="6305371" y="4451952"/>
                 </a:cubicBezTo>
-                <a:lnTo>
-                  <a:pt x="139350" y="3965384"/>
-                </a:lnTo>
                 <a:cubicBezTo>
-                  <a:pt x="-313731" y="2688520"/>
-                  <a:pt x="468864" y="1386941"/>
-                  <a:pt x="633621" y="97720"/>
+                  <a:pt x="5308300" y="4489022"/>
+                  <a:pt x="4761453" y="4414882"/>
+                  <a:pt x="4164582" y="5329281"/>
+                </a:cubicBezTo>
+                <a:cubicBezTo>
+                  <a:pt x="3815001" y="4600232"/>
+                  <a:pt x="1176775" y="4847368"/>
+                  <a:pt x="139350" y="4686730"/>
+                </a:cubicBezTo>
+                <a:cubicBezTo>
+                  <a:pt x="-313731" y="3409866"/>
+                  <a:pt x="468864" y="2108287"/>
+                  <a:pt x="633621" y="819066"/>
+                </a:cubicBezTo>
+                <a:close/>
+              </a:path>
+            </a:pathLst>
+          </a:custGeom>
+          <a:solidFill>
+            <a:srgbClr val="FFC000"/>
+          </a:solidFill>
+          <a:ln w="3175"/>
+        </p:spPr>
+        <p:style>
+          <a:lnRef idx="2">
+            <a:schemeClr val="accent1">
+              <a:shade val="50000"/>
+            </a:schemeClr>
+          </a:lnRef>
+          <a:fillRef idx="1">
+            <a:schemeClr val="accent1"/>
+          </a:fillRef>
+          <a:effectRef idx="0">
+            <a:schemeClr val="accent1"/>
+          </a:effectRef>
+          <a:fontRef idx="minor">
+            <a:schemeClr val="lt1"/>
+          </a:fontRef>
+        </p:style>
+        <p:txBody>
+          <a:bodyPr rtlCol="0" anchor="ctr"/>
+          <a:lstStyle/>
+          <a:p>
+            <a:pPr algn="ctr"/>
+            <a:endParaRPr lang="en-US" dirty="0"/>
+          </a:p>
+        </p:txBody>
+      </p:sp>
+      <p:sp>
+        <p:nvSpPr>
+          <p:cNvPr id="7" name=".id(lowres1) details(hires, 8)">
+            <a:extLst>
+              <a:ext uri="{FF2B5EF4-FFF2-40B4-BE49-F238E27FC236}">
+                <a16:creationId xmlns:a16="http://schemas.microsoft.com/office/drawing/2014/main" id="{9A0448A4-787B-1743-8BD4-BB2C06889F3A}"/>
+              </a:ext>
+            </a:extLst>
+          </p:cNvPr>
+          <p:cNvSpPr/>
+          <p:nvPr/>
+        </p:nvSpPr>
+        <p:spPr>
+          <a:xfrm rot="20619307">
+            <a:off x="7453772" y="2056269"/>
+            <a:ext cx="94959" cy="76891"/>
+          </a:xfrm>
+          <a:custGeom>
+            <a:avLst/>
+            <a:gdLst>
+              <a:gd name="connsiteX0" fmla="*/ 0 w 6042453"/>
+              <a:gd name="connsiteY0" fmla="*/ 0 h 3867664"/>
+              <a:gd name="connsiteX1" fmla="*/ 6042453 w 6042453"/>
+              <a:gd name="connsiteY1" fmla="*/ 0 h 3867664"/>
+              <a:gd name="connsiteX2" fmla="*/ 6042453 w 6042453"/>
+              <a:gd name="connsiteY2" fmla="*/ 3867664 h 3867664"/>
+              <a:gd name="connsiteX3" fmla="*/ 0 w 6042453"/>
+              <a:gd name="connsiteY3" fmla="*/ 3867664 h 3867664"/>
+              <a:gd name="connsiteX4" fmla="*/ 0 w 6042453"/>
+              <a:gd name="connsiteY4" fmla="*/ 0 h 3867664"/>
+              <a:gd name="connsiteX0" fmla="*/ 370703 w 6042453"/>
+              <a:gd name="connsiteY0" fmla="*/ 234778 h 3867664"/>
+              <a:gd name="connsiteX1" fmla="*/ 6042453 w 6042453"/>
+              <a:gd name="connsiteY1" fmla="*/ 0 h 3867664"/>
+              <a:gd name="connsiteX2" fmla="*/ 6042453 w 6042453"/>
+              <a:gd name="connsiteY2" fmla="*/ 3867664 h 3867664"/>
+              <a:gd name="connsiteX3" fmla="*/ 0 w 6042453"/>
+              <a:gd name="connsiteY3" fmla="*/ 3867664 h 3867664"/>
+              <a:gd name="connsiteX4" fmla="*/ 370703 w 6042453"/>
+              <a:gd name="connsiteY4" fmla="*/ 234778 h 3867664"/>
+              <a:gd name="connsiteX0" fmla="*/ 370703 w 6042453"/>
+              <a:gd name="connsiteY0" fmla="*/ 234778 h 3867664"/>
+              <a:gd name="connsiteX1" fmla="*/ 3400168 w 6042453"/>
+              <a:gd name="connsiteY1" fmla="*/ 321275 h 3867664"/>
+              <a:gd name="connsiteX2" fmla="*/ 6042453 w 6042453"/>
+              <a:gd name="connsiteY2" fmla="*/ 0 h 3867664"/>
+              <a:gd name="connsiteX3" fmla="*/ 6042453 w 6042453"/>
+              <a:gd name="connsiteY3" fmla="*/ 3867664 h 3867664"/>
+              <a:gd name="connsiteX4" fmla="*/ 0 w 6042453"/>
+              <a:gd name="connsiteY4" fmla="*/ 3867664 h 3867664"/>
+              <a:gd name="connsiteX5" fmla="*/ 370703 w 6042453"/>
+              <a:gd name="connsiteY5" fmla="*/ 234778 h 3867664"/>
+              <a:gd name="connsiteX0" fmla="*/ 370703 w 6042453"/>
+              <a:gd name="connsiteY0" fmla="*/ 9462 h 3642348"/>
+              <a:gd name="connsiteX1" fmla="*/ 3400168 w 6042453"/>
+              <a:gd name="connsiteY1" fmla="*/ 95959 h 3642348"/>
+              <a:gd name="connsiteX2" fmla="*/ 5906529 w 6042453"/>
+              <a:gd name="connsiteY2" fmla="*/ 9462 h 3642348"/>
+              <a:gd name="connsiteX3" fmla="*/ 6042453 w 6042453"/>
+              <a:gd name="connsiteY3" fmla="*/ 3642348 h 3642348"/>
+              <a:gd name="connsiteX4" fmla="*/ 0 w 6042453"/>
+              <a:gd name="connsiteY4" fmla="*/ 3642348 h 3642348"/>
+              <a:gd name="connsiteX5" fmla="*/ 370703 w 6042453"/>
+              <a:gd name="connsiteY5" fmla="*/ 9462 h 3642348"/>
+              <a:gd name="connsiteX0" fmla="*/ 370703 w 6398255"/>
+              <a:gd name="connsiteY0" fmla="*/ 9462 h 3642348"/>
+              <a:gd name="connsiteX1" fmla="*/ 3400168 w 6398255"/>
+              <a:gd name="connsiteY1" fmla="*/ 95959 h 3642348"/>
+              <a:gd name="connsiteX2" fmla="*/ 5906529 w 6398255"/>
+              <a:gd name="connsiteY2" fmla="*/ 9462 h 3642348"/>
+              <a:gd name="connsiteX3" fmla="*/ 6042453 w 6398255"/>
+              <a:gd name="connsiteY3" fmla="*/ 3642348 h 3642348"/>
+              <a:gd name="connsiteX4" fmla="*/ 0 w 6398255"/>
+              <a:gd name="connsiteY4" fmla="*/ 3642348 h 3642348"/>
+              <a:gd name="connsiteX5" fmla="*/ 370703 w 6398255"/>
+              <a:gd name="connsiteY5" fmla="*/ 9462 h 3642348"/>
+              <a:gd name="connsiteX0" fmla="*/ 494271 w 6521823"/>
+              <a:gd name="connsiteY0" fmla="*/ 9462 h 3877126"/>
+              <a:gd name="connsiteX1" fmla="*/ 3523736 w 6521823"/>
+              <a:gd name="connsiteY1" fmla="*/ 95959 h 3877126"/>
+              <a:gd name="connsiteX2" fmla="*/ 6030097 w 6521823"/>
+              <a:gd name="connsiteY2" fmla="*/ 9462 h 3877126"/>
+              <a:gd name="connsiteX3" fmla="*/ 6166021 w 6521823"/>
+              <a:gd name="connsiteY3" fmla="*/ 3642348 h 3877126"/>
+              <a:gd name="connsiteX4" fmla="*/ 0 w 6521823"/>
+              <a:gd name="connsiteY4" fmla="*/ 3877126 h 3877126"/>
+              <a:gd name="connsiteX5" fmla="*/ 494271 w 6521823"/>
+              <a:gd name="connsiteY5" fmla="*/ 9462 h 3877126"/>
+              <a:gd name="connsiteX0" fmla="*/ 633621 w 6661173"/>
+              <a:gd name="connsiteY0" fmla="*/ 9462 h 3877126"/>
+              <a:gd name="connsiteX1" fmla="*/ 3663086 w 6661173"/>
+              <a:gd name="connsiteY1" fmla="*/ 95959 h 3877126"/>
+              <a:gd name="connsiteX2" fmla="*/ 6169447 w 6661173"/>
+              <a:gd name="connsiteY2" fmla="*/ 9462 h 3877126"/>
+              <a:gd name="connsiteX3" fmla="*/ 6305371 w 6661173"/>
+              <a:gd name="connsiteY3" fmla="*/ 3642348 h 3877126"/>
+              <a:gd name="connsiteX4" fmla="*/ 139350 w 6661173"/>
+              <a:gd name="connsiteY4" fmla="*/ 3877126 h 3877126"/>
+              <a:gd name="connsiteX5" fmla="*/ 633621 w 6661173"/>
+              <a:gd name="connsiteY5" fmla="*/ 9462 h 3877126"/>
+              <a:gd name="connsiteX0" fmla="*/ 633621 w 6661173"/>
+              <a:gd name="connsiteY0" fmla="*/ 256277 h 4123941"/>
+              <a:gd name="connsiteX1" fmla="*/ 3663086 w 6661173"/>
+              <a:gd name="connsiteY1" fmla="*/ 342774 h 4123941"/>
+              <a:gd name="connsiteX2" fmla="*/ 6169447 w 6661173"/>
+              <a:gd name="connsiteY2" fmla="*/ 256277 h 4123941"/>
+              <a:gd name="connsiteX3" fmla="*/ 6305371 w 6661173"/>
+              <a:gd name="connsiteY3" fmla="*/ 3889163 h 4123941"/>
+              <a:gd name="connsiteX4" fmla="*/ 139350 w 6661173"/>
+              <a:gd name="connsiteY4" fmla="*/ 4123941 h 4123941"/>
+              <a:gd name="connsiteX5" fmla="*/ 633621 w 6661173"/>
+              <a:gd name="connsiteY5" fmla="*/ 256277 h 4123941"/>
+              <a:gd name="connsiteX0" fmla="*/ 633621 w 6661173"/>
+              <a:gd name="connsiteY0" fmla="*/ 256277 h 4123941"/>
+              <a:gd name="connsiteX1" fmla="*/ 3663086 w 6661173"/>
+              <a:gd name="connsiteY1" fmla="*/ 342774 h 4123941"/>
+              <a:gd name="connsiteX2" fmla="*/ 6169447 w 6661173"/>
+              <a:gd name="connsiteY2" fmla="*/ 256277 h 4123941"/>
+              <a:gd name="connsiteX3" fmla="*/ 6305371 w 6661173"/>
+              <a:gd name="connsiteY3" fmla="*/ 3889163 h 4123941"/>
+              <a:gd name="connsiteX4" fmla="*/ 139350 w 6661173"/>
+              <a:gd name="connsiteY4" fmla="*/ 4123941 h 4123941"/>
+              <a:gd name="connsiteX5" fmla="*/ 633621 w 6661173"/>
+              <a:gd name="connsiteY5" fmla="*/ 256277 h 4123941"/>
+              <a:gd name="connsiteX0" fmla="*/ 633621 w 6661173"/>
+              <a:gd name="connsiteY0" fmla="*/ 235646 h 4103310"/>
+              <a:gd name="connsiteX1" fmla="*/ 3663086 w 6661173"/>
+              <a:gd name="connsiteY1" fmla="*/ 322143 h 4103310"/>
+              <a:gd name="connsiteX2" fmla="*/ 6169447 w 6661173"/>
+              <a:gd name="connsiteY2" fmla="*/ 235646 h 4103310"/>
+              <a:gd name="connsiteX3" fmla="*/ 6305371 w 6661173"/>
+              <a:gd name="connsiteY3" fmla="*/ 3868532 h 4103310"/>
+              <a:gd name="connsiteX4" fmla="*/ 139350 w 6661173"/>
+              <a:gd name="connsiteY4" fmla="*/ 4103310 h 4103310"/>
+              <a:gd name="connsiteX5" fmla="*/ 633621 w 6661173"/>
+              <a:gd name="connsiteY5" fmla="*/ 235646 h 4103310"/>
+              <a:gd name="connsiteX0" fmla="*/ 633621 w 6661173"/>
+              <a:gd name="connsiteY0" fmla="*/ 190623 h 4058287"/>
+              <a:gd name="connsiteX1" fmla="*/ 3663086 w 6661173"/>
+              <a:gd name="connsiteY1" fmla="*/ 277120 h 4058287"/>
+              <a:gd name="connsiteX2" fmla="*/ 6169447 w 6661173"/>
+              <a:gd name="connsiteY2" fmla="*/ 190623 h 4058287"/>
+              <a:gd name="connsiteX3" fmla="*/ 6305371 w 6661173"/>
+              <a:gd name="connsiteY3" fmla="*/ 3823509 h 4058287"/>
+              <a:gd name="connsiteX4" fmla="*/ 139350 w 6661173"/>
+              <a:gd name="connsiteY4" fmla="*/ 4058287 h 4058287"/>
+              <a:gd name="connsiteX5" fmla="*/ 633621 w 6661173"/>
+              <a:gd name="connsiteY5" fmla="*/ 190623 h 4058287"/>
+              <a:gd name="connsiteX0" fmla="*/ 633621 w 6661173"/>
+              <a:gd name="connsiteY0" fmla="*/ 97720 h 3965384"/>
+              <a:gd name="connsiteX1" fmla="*/ 3663086 w 6661173"/>
+              <a:gd name="connsiteY1" fmla="*/ 184217 h 3965384"/>
+              <a:gd name="connsiteX2" fmla="*/ 6169447 w 6661173"/>
+              <a:gd name="connsiteY2" fmla="*/ 97720 h 3965384"/>
+              <a:gd name="connsiteX3" fmla="*/ 6305371 w 6661173"/>
+              <a:gd name="connsiteY3" fmla="*/ 3730606 h 3965384"/>
+              <a:gd name="connsiteX4" fmla="*/ 139350 w 6661173"/>
+              <a:gd name="connsiteY4" fmla="*/ 3965384 h 3965384"/>
+              <a:gd name="connsiteX5" fmla="*/ 633621 w 6661173"/>
+              <a:gd name="connsiteY5" fmla="*/ 97720 h 3965384"/>
+              <a:gd name="connsiteX0" fmla="*/ 633621 w 6661173"/>
+              <a:gd name="connsiteY0" fmla="*/ 1219541 h 5087205"/>
+              <a:gd name="connsiteX1" fmla="*/ 3638074 w 6661173"/>
+              <a:gd name="connsiteY1" fmla="*/ 45649 h 5087205"/>
+              <a:gd name="connsiteX2" fmla="*/ 6169447 w 6661173"/>
+              <a:gd name="connsiteY2" fmla="*/ 1219541 h 5087205"/>
+              <a:gd name="connsiteX3" fmla="*/ 6305371 w 6661173"/>
+              <a:gd name="connsiteY3" fmla="*/ 4852427 h 5087205"/>
+              <a:gd name="connsiteX4" fmla="*/ 139350 w 6661173"/>
+              <a:gd name="connsiteY4" fmla="*/ 5087205 h 5087205"/>
+              <a:gd name="connsiteX5" fmla="*/ 633621 w 6661173"/>
+              <a:gd name="connsiteY5" fmla="*/ 1219541 h 5087205"/>
+              <a:gd name="connsiteX0" fmla="*/ 633621 w 6661173"/>
+              <a:gd name="connsiteY0" fmla="*/ 1368268 h 5235932"/>
+              <a:gd name="connsiteX1" fmla="*/ 3638074 w 6661173"/>
+              <a:gd name="connsiteY1" fmla="*/ 194376 h 5235932"/>
+              <a:gd name="connsiteX2" fmla="*/ 6169447 w 6661173"/>
+              <a:gd name="connsiteY2" fmla="*/ 1368268 h 5235932"/>
+              <a:gd name="connsiteX3" fmla="*/ 6305371 w 6661173"/>
+              <a:gd name="connsiteY3" fmla="*/ 5001154 h 5235932"/>
+              <a:gd name="connsiteX4" fmla="*/ 139350 w 6661173"/>
+              <a:gd name="connsiteY4" fmla="*/ 5235932 h 5235932"/>
+              <a:gd name="connsiteX5" fmla="*/ 633621 w 6661173"/>
+              <a:gd name="connsiteY5" fmla="*/ 1368268 h 5235932"/>
+              <a:gd name="connsiteX0" fmla="*/ 633621 w 6661173"/>
+              <a:gd name="connsiteY0" fmla="*/ 857602 h 4725266"/>
+              <a:gd name="connsiteX1" fmla="*/ 3613062 w 6661173"/>
+              <a:gd name="connsiteY1" fmla="*/ 252120 h 4725266"/>
+              <a:gd name="connsiteX2" fmla="*/ 6169447 w 6661173"/>
+              <a:gd name="connsiteY2" fmla="*/ 857602 h 4725266"/>
+              <a:gd name="connsiteX3" fmla="*/ 6305371 w 6661173"/>
+              <a:gd name="connsiteY3" fmla="*/ 4490488 h 4725266"/>
+              <a:gd name="connsiteX4" fmla="*/ 139350 w 6661173"/>
+              <a:gd name="connsiteY4" fmla="*/ 4725266 h 4725266"/>
+              <a:gd name="connsiteX5" fmla="*/ 633621 w 6661173"/>
+              <a:gd name="connsiteY5" fmla="*/ 857602 h 4725266"/>
+              <a:gd name="connsiteX0" fmla="*/ 633621 w 6661173"/>
+              <a:gd name="connsiteY0" fmla="*/ 1003890 h 4871554"/>
+              <a:gd name="connsiteX1" fmla="*/ 3613062 w 6661173"/>
+              <a:gd name="connsiteY1" fmla="*/ 398408 h 4871554"/>
+              <a:gd name="connsiteX2" fmla="*/ 6169447 w 6661173"/>
+              <a:gd name="connsiteY2" fmla="*/ 1003890 h 4871554"/>
+              <a:gd name="connsiteX3" fmla="*/ 6305371 w 6661173"/>
+              <a:gd name="connsiteY3" fmla="*/ 4636776 h 4871554"/>
+              <a:gd name="connsiteX4" fmla="*/ 139350 w 6661173"/>
+              <a:gd name="connsiteY4" fmla="*/ 4871554 h 4871554"/>
+              <a:gd name="connsiteX5" fmla="*/ 633621 w 6661173"/>
+              <a:gd name="connsiteY5" fmla="*/ 1003890 h 4871554"/>
+              <a:gd name="connsiteX0" fmla="*/ 633621 w 6661173"/>
+              <a:gd name="connsiteY0" fmla="*/ 1022408 h 4890072"/>
+              <a:gd name="connsiteX1" fmla="*/ 3613062 w 6661173"/>
+              <a:gd name="connsiteY1" fmla="*/ 416926 h 4890072"/>
+              <a:gd name="connsiteX2" fmla="*/ 6169447 w 6661173"/>
+              <a:gd name="connsiteY2" fmla="*/ 1022408 h 4890072"/>
+              <a:gd name="connsiteX3" fmla="*/ 6305371 w 6661173"/>
+              <a:gd name="connsiteY3" fmla="*/ 4655294 h 4890072"/>
+              <a:gd name="connsiteX4" fmla="*/ 139350 w 6661173"/>
+              <a:gd name="connsiteY4" fmla="*/ 4890072 h 4890072"/>
+              <a:gd name="connsiteX5" fmla="*/ 633621 w 6661173"/>
+              <a:gd name="connsiteY5" fmla="*/ 1022408 h 4890072"/>
+              <a:gd name="connsiteX0" fmla="*/ 633621 w 6661173"/>
+              <a:gd name="connsiteY0" fmla="*/ 819066 h 4686730"/>
+              <a:gd name="connsiteX1" fmla="*/ 3450480 w 6661173"/>
+              <a:gd name="connsiteY1" fmla="*/ 460719 h 4686730"/>
+              <a:gd name="connsiteX2" fmla="*/ 6169447 w 6661173"/>
+              <a:gd name="connsiteY2" fmla="*/ 819066 h 4686730"/>
+              <a:gd name="connsiteX3" fmla="*/ 6305371 w 6661173"/>
+              <a:gd name="connsiteY3" fmla="*/ 4451952 h 4686730"/>
+              <a:gd name="connsiteX4" fmla="*/ 139350 w 6661173"/>
+              <a:gd name="connsiteY4" fmla="*/ 4686730 h 4686730"/>
+              <a:gd name="connsiteX5" fmla="*/ 633621 w 6661173"/>
+              <a:gd name="connsiteY5" fmla="*/ 819066 h 4686730"/>
+              <a:gd name="connsiteX0" fmla="*/ 633621 w 6661173"/>
+              <a:gd name="connsiteY0" fmla="*/ 819066 h 5168644"/>
+              <a:gd name="connsiteX1" fmla="*/ 3450480 w 6661173"/>
+              <a:gd name="connsiteY1" fmla="*/ 460719 h 5168644"/>
+              <a:gd name="connsiteX2" fmla="*/ 6169447 w 6661173"/>
+              <a:gd name="connsiteY2" fmla="*/ 819066 h 5168644"/>
+              <a:gd name="connsiteX3" fmla="*/ 6305371 w 6661173"/>
+              <a:gd name="connsiteY3" fmla="*/ 4451952 h 5168644"/>
+              <a:gd name="connsiteX4" fmla="*/ 3251626 w 6661173"/>
+              <a:gd name="connsiteY4" fmla="*/ 5168644 h 5168644"/>
+              <a:gd name="connsiteX5" fmla="*/ 139350 w 6661173"/>
+              <a:gd name="connsiteY5" fmla="*/ 4686730 h 5168644"/>
+              <a:gd name="connsiteX6" fmla="*/ 633621 w 6661173"/>
+              <a:gd name="connsiteY6" fmla="*/ 819066 h 5168644"/>
+              <a:gd name="connsiteX0" fmla="*/ 633621 w 6661173"/>
+              <a:gd name="connsiteY0" fmla="*/ 819066 h 5168644"/>
+              <a:gd name="connsiteX1" fmla="*/ 3450480 w 6661173"/>
+              <a:gd name="connsiteY1" fmla="*/ 460719 h 5168644"/>
+              <a:gd name="connsiteX2" fmla="*/ 6169447 w 6661173"/>
+              <a:gd name="connsiteY2" fmla="*/ 819066 h 5168644"/>
+              <a:gd name="connsiteX3" fmla="*/ 6305371 w 6661173"/>
+              <a:gd name="connsiteY3" fmla="*/ 4451952 h 5168644"/>
+              <a:gd name="connsiteX4" fmla="*/ 3251626 w 6661173"/>
+              <a:gd name="connsiteY4" fmla="*/ 5168644 h 5168644"/>
+              <a:gd name="connsiteX5" fmla="*/ 139350 w 6661173"/>
+              <a:gd name="connsiteY5" fmla="*/ 4686730 h 5168644"/>
+              <a:gd name="connsiteX6" fmla="*/ 633621 w 6661173"/>
+              <a:gd name="connsiteY6" fmla="*/ 819066 h 5168644"/>
+              <a:gd name="connsiteX0" fmla="*/ 633621 w 6661173"/>
+              <a:gd name="connsiteY0" fmla="*/ 819066 h 5168644"/>
+              <a:gd name="connsiteX1" fmla="*/ 3450480 w 6661173"/>
+              <a:gd name="connsiteY1" fmla="*/ 460719 h 5168644"/>
+              <a:gd name="connsiteX2" fmla="*/ 6169447 w 6661173"/>
+              <a:gd name="connsiteY2" fmla="*/ 819066 h 5168644"/>
+              <a:gd name="connsiteX3" fmla="*/ 6305371 w 6661173"/>
+              <a:gd name="connsiteY3" fmla="*/ 4451952 h 5168644"/>
+              <a:gd name="connsiteX4" fmla="*/ 3251626 w 6661173"/>
+              <a:gd name="connsiteY4" fmla="*/ 5168644 h 5168644"/>
+              <a:gd name="connsiteX5" fmla="*/ 139350 w 6661173"/>
+              <a:gd name="connsiteY5" fmla="*/ 4686730 h 5168644"/>
+              <a:gd name="connsiteX6" fmla="*/ 633621 w 6661173"/>
+              <a:gd name="connsiteY6" fmla="*/ 819066 h 5168644"/>
+              <a:gd name="connsiteX0" fmla="*/ 633621 w 6661173"/>
+              <a:gd name="connsiteY0" fmla="*/ 819066 h 5329281"/>
+              <a:gd name="connsiteX1" fmla="*/ 3450480 w 6661173"/>
+              <a:gd name="connsiteY1" fmla="*/ 460719 h 5329281"/>
+              <a:gd name="connsiteX2" fmla="*/ 6169447 w 6661173"/>
+              <a:gd name="connsiteY2" fmla="*/ 819066 h 5329281"/>
+              <a:gd name="connsiteX3" fmla="*/ 6305371 w 6661173"/>
+              <a:gd name="connsiteY3" fmla="*/ 4451952 h 5329281"/>
+              <a:gd name="connsiteX4" fmla="*/ 4164582 w 6661173"/>
+              <a:gd name="connsiteY4" fmla="*/ 5329281 h 5329281"/>
+              <a:gd name="connsiteX5" fmla="*/ 139350 w 6661173"/>
+              <a:gd name="connsiteY5" fmla="*/ 4686730 h 5329281"/>
+              <a:gd name="connsiteX6" fmla="*/ 633621 w 6661173"/>
+              <a:gd name="connsiteY6" fmla="*/ 819066 h 5329281"/>
+              <a:gd name="connsiteX0" fmla="*/ 633621 w 6661173"/>
+              <a:gd name="connsiteY0" fmla="*/ 819066 h 5329281"/>
+              <a:gd name="connsiteX1" fmla="*/ 3450480 w 6661173"/>
+              <a:gd name="connsiteY1" fmla="*/ 460719 h 5329281"/>
+              <a:gd name="connsiteX2" fmla="*/ 6169447 w 6661173"/>
+              <a:gd name="connsiteY2" fmla="*/ 819066 h 5329281"/>
+              <a:gd name="connsiteX3" fmla="*/ 6305371 w 6661173"/>
+              <a:gd name="connsiteY3" fmla="*/ 4451952 h 5329281"/>
+              <a:gd name="connsiteX4" fmla="*/ 4164582 w 6661173"/>
+              <a:gd name="connsiteY4" fmla="*/ 5329281 h 5329281"/>
+              <a:gd name="connsiteX5" fmla="*/ 139350 w 6661173"/>
+              <a:gd name="connsiteY5" fmla="*/ 4686730 h 5329281"/>
+              <a:gd name="connsiteX6" fmla="*/ 633621 w 6661173"/>
+              <a:gd name="connsiteY6" fmla="*/ 819066 h 5329281"/>
+            </a:gdLst>
+            <a:ahLst/>
+            <a:cxnLst>
+              <a:cxn ang="0">
+                <a:pos x="connsiteX0" y="connsiteY0"/>
+              </a:cxn>
+              <a:cxn ang="0">
+                <a:pos x="connsiteX1" y="connsiteY1"/>
+              </a:cxn>
+              <a:cxn ang="0">
+                <a:pos x="connsiteX2" y="connsiteY2"/>
+              </a:cxn>
+              <a:cxn ang="0">
+                <a:pos x="connsiteX3" y="connsiteY3"/>
+              </a:cxn>
+              <a:cxn ang="0">
+                <a:pos x="connsiteX4" y="connsiteY4"/>
+              </a:cxn>
+              <a:cxn ang="0">
+                <a:pos x="connsiteX5" y="connsiteY5"/>
+              </a:cxn>
+              <a:cxn ang="0">
+                <a:pos x="connsiteX6" y="connsiteY6"/>
+              </a:cxn>
+            </a:cxnLst>
+            <a:rect l="l" t="t" r="r" b="b"/>
+            <a:pathLst>
+              <a:path w="6661173" h="5329281">
+                <a:moveTo>
+                  <a:pt x="633621" y="819066"/>
+                </a:moveTo>
+                <a:cubicBezTo>
+                  <a:pt x="1688751" y="765520"/>
+                  <a:pt x="3213093" y="-733768"/>
+                  <a:pt x="3450480" y="460719"/>
+                </a:cubicBezTo>
+                <a:cubicBezTo>
+                  <a:pt x="3948812" y="-717291"/>
+                  <a:pt x="5333993" y="847898"/>
+                  <a:pt x="6169447" y="819066"/>
+                </a:cubicBezTo>
+                <a:cubicBezTo>
+                  <a:pt x="7215653" y="1313337"/>
+                  <a:pt x="6260063" y="3240990"/>
+                  <a:pt x="6305371" y="4451952"/>
+                </a:cubicBezTo>
+                <a:cubicBezTo>
+                  <a:pt x="5308300" y="4489022"/>
+                  <a:pt x="4761453" y="4414882"/>
+                  <a:pt x="4164582" y="5329281"/>
+                </a:cubicBezTo>
+                <a:cubicBezTo>
+                  <a:pt x="3815001" y="4600232"/>
+                  <a:pt x="1176775" y="4847368"/>
+                  <a:pt x="139350" y="4686730"/>
+                </a:cubicBezTo>
+                <a:cubicBezTo>
+                  <a:pt x="-313731" y="3409866"/>
+                  <a:pt x="468864" y="2108287"/>
+                  <a:pt x="633621" y="819066"/>
+                </a:cubicBezTo>
+                <a:close/>
+              </a:path>
+            </a:pathLst>
+          </a:custGeom>
+          <a:solidFill>
+            <a:srgbClr val="FFC000"/>
+          </a:solidFill>
+          <a:ln w="3175"/>
+        </p:spPr>
+        <p:style>
+          <a:lnRef idx="2">
+            <a:schemeClr val="accent1">
+              <a:shade val="50000"/>
+            </a:schemeClr>
+          </a:lnRef>
+          <a:fillRef idx="1">
+            <a:schemeClr val="accent1"/>
+          </a:fillRef>
+          <a:effectRef idx="0">
+            <a:schemeClr val="accent1"/>
+          </a:effectRef>
+          <a:fontRef idx="minor">
+            <a:schemeClr val="lt1"/>
+          </a:fontRef>
+        </p:style>
+        <p:txBody>
+          <a:bodyPr rtlCol="0" anchor="ctr"/>
+          <a:lstStyle/>
+          <a:p>
+            <a:pPr algn="ctr"/>
+            <a:endParaRPr lang="en-US" dirty="0"/>
+          </a:p>
+        </p:txBody>
+      </p:sp>
+    </p:spTree>
+    <p:extLst>
+      <p:ext uri="{BB962C8B-B14F-4D97-AF65-F5344CB8AC3E}">
+        <p14:creationId xmlns:p14="http://schemas.microsoft.com/office/powerpoint/2010/main" val="1382586919"/>
+      </p:ext>
+    </p:extLst>
+  </p:cSld>
+  <p:clrMapOvr>
+    <a:masterClrMapping/>
+  </p:clrMapOvr>
+</p:sld>
+</file>
+
+<file path=ppt/slides/slide2.xml><?xml version="1.0" encoding="utf-8"?>
+<p:sld xmlns:a="http://schemas.openxmlformats.org/drawingml/2006/main" xmlns:r="http://schemas.openxmlformats.org/officeDocument/2006/relationships" xmlns:p="http://schemas.openxmlformats.org/presentationml/2006/main">
+  <p:cSld>
+    <p:spTree>
+      <p:nvGrpSpPr>
+        <p:cNvPr id="1" name=""/>
+        <p:cNvGrpSpPr/>
+        <p:nvPr/>
+      </p:nvGrpSpPr>
+      <p:grpSpPr>
+        <a:xfrm>
+          <a:off x="0" y="0"/>
+          <a:ext cx="0" cy="0"/>
+          <a:chOff x="0" y="0"/>
+          <a:chExt cx="0" cy="0"/>
+        </a:xfrm>
+      </p:grpSpPr>
+      <p:sp>
+        <p:nvSpPr>
+          <p:cNvPr id="2" name=".id(a1)">
+            <a:extLst>
+              <a:ext uri="{FF2B5EF4-FFF2-40B4-BE49-F238E27FC236}">
+                <a16:creationId xmlns:a16="http://schemas.microsoft.com/office/drawing/2014/main" id="{1B7FAEA9-0041-CB42-B702-9A340BA6E54F}"/>
+              </a:ext>
+            </a:extLst>
+          </p:cNvPr>
+          <p:cNvSpPr/>
+          <p:nvPr/>
+        </p:nvSpPr>
+        <p:spPr>
+          <a:xfrm>
+            <a:off x="2891481" y="1046805"/>
+            <a:ext cx="6581547" cy="5329281"/>
+          </a:xfrm>
+          <a:custGeom>
+            <a:avLst/>
+            <a:gdLst>
+              <a:gd name="connsiteX0" fmla="*/ 0 w 6042453"/>
+              <a:gd name="connsiteY0" fmla="*/ 0 h 3867664"/>
+              <a:gd name="connsiteX1" fmla="*/ 6042453 w 6042453"/>
+              <a:gd name="connsiteY1" fmla="*/ 0 h 3867664"/>
+              <a:gd name="connsiteX2" fmla="*/ 6042453 w 6042453"/>
+              <a:gd name="connsiteY2" fmla="*/ 3867664 h 3867664"/>
+              <a:gd name="connsiteX3" fmla="*/ 0 w 6042453"/>
+              <a:gd name="connsiteY3" fmla="*/ 3867664 h 3867664"/>
+              <a:gd name="connsiteX4" fmla="*/ 0 w 6042453"/>
+              <a:gd name="connsiteY4" fmla="*/ 0 h 3867664"/>
+              <a:gd name="connsiteX0" fmla="*/ 370703 w 6042453"/>
+              <a:gd name="connsiteY0" fmla="*/ 234778 h 3867664"/>
+              <a:gd name="connsiteX1" fmla="*/ 6042453 w 6042453"/>
+              <a:gd name="connsiteY1" fmla="*/ 0 h 3867664"/>
+              <a:gd name="connsiteX2" fmla="*/ 6042453 w 6042453"/>
+              <a:gd name="connsiteY2" fmla="*/ 3867664 h 3867664"/>
+              <a:gd name="connsiteX3" fmla="*/ 0 w 6042453"/>
+              <a:gd name="connsiteY3" fmla="*/ 3867664 h 3867664"/>
+              <a:gd name="connsiteX4" fmla="*/ 370703 w 6042453"/>
+              <a:gd name="connsiteY4" fmla="*/ 234778 h 3867664"/>
+              <a:gd name="connsiteX0" fmla="*/ 370703 w 6042453"/>
+              <a:gd name="connsiteY0" fmla="*/ 234778 h 3867664"/>
+              <a:gd name="connsiteX1" fmla="*/ 3400168 w 6042453"/>
+              <a:gd name="connsiteY1" fmla="*/ 321275 h 3867664"/>
+              <a:gd name="connsiteX2" fmla="*/ 6042453 w 6042453"/>
+              <a:gd name="connsiteY2" fmla="*/ 0 h 3867664"/>
+              <a:gd name="connsiteX3" fmla="*/ 6042453 w 6042453"/>
+              <a:gd name="connsiteY3" fmla="*/ 3867664 h 3867664"/>
+              <a:gd name="connsiteX4" fmla="*/ 0 w 6042453"/>
+              <a:gd name="connsiteY4" fmla="*/ 3867664 h 3867664"/>
+              <a:gd name="connsiteX5" fmla="*/ 370703 w 6042453"/>
+              <a:gd name="connsiteY5" fmla="*/ 234778 h 3867664"/>
+              <a:gd name="connsiteX0" fmla="*/ 370703 w 6042453"/>
+              <a:gd name="connsiteY0" fmla="*/ 9462 h 3642348"/>
+              <a:gd name="connsiteX1" fmla="*/ 3400168 w 6042453"/>
+              <a:gd name="connsiteY1" fmla="*/ 95959 h 3642348"/>
+              <a:gd name="connsiteX2" fmla="*/ 5906529 w 6042453"/>
+              <a:gd name="connsiteY2" fmla="*/ 9462 h 3642348"/>
+              <a:gd name="connsiteX3" fmla="*/ 6042453 w 6042453"/>
+              <a:gd name="connsiteY3" fmla="*/ 3642348 h 3642348"/>
+              <a:gd name="connsiteX4" fmla="*/ 0 w 6042453"/>
+              <a:gd name="connsiteY4" fmla="*/ 3642348 h 3642348"/>
+              <a:gd name="connsiteX5" fmla="*/ 370703 w 6042453"/>
+              <a:gd name="connsiteY5" fmla="*/ 9462 h 3642348"/>
+              <a:gd name="connsiteX0" fmla="*/ 370703 w 6398255"/>
+              <a:gd name="connsiteY0" fmla="*/ 9462 h 3642348"/>
+              <a:gd name="connsiteX1" fmla="*/ 3400168 w 6398255"/>
+              <a:gd name="connsiteY1" fmla="*/ 95959 h 3642348"/>
+              <a:gd name="connsiteX2" fmla="*/ 5906529 w 6398255"/>
+              <a:gd name="connsiteY2" fmla="*/ 9462 h 3642348"/>
+              <a:gd name="connsiteX3" fmla="*/ 6042453 w 6398255"/>
+              <a:gd name="connsiteY3" fmla="*/ 3642348 h 3642348"/>
+              <a:gd name="connsiteX4" fmla="*/ 0 w 6398255"/>
+              <a:gd name="connsiteY4" fmla="*/ 3642348 h 3642348"/>
+              <a:gd name="connsiteX5" fmla="*/ 370703 w 6398255"/>
+              <a:gd name="connsiteY5" fmla="*/ 9462 h 3642348"/>
+              <a:gd name="connsiteX0" fmla="*/ 494271 w 6521823"/>
+              <a:gd name="connsiteY0" fmla="*/ 9462 h 3877126"/>
+              <a:gd name="connsiteX1" fmla="*/ 3523736 w 6521823"/>
+              <a:gd name="connsiteY1" fmla="*/ 95959 h 3877126"/>
+              <a:gd name="connsiteX2" fmla="*/ 6030097 w 6521823"/>
+              <a:gd name="connsiteY2" fmla="*/ 9462 h 3877126"/>
+              <a:gd name="connsiteX3" fmla="*/ 6166021 w 6521823"/>
+              <a:gd name="connsiteY3" fmla="*/ 3642348 h 3877126"/>
+              <a:gd name="connsiteX4" fmla="*/ 0 w 6521823"/>
+              <a:gd name="connsiteY4" fmla="*/ 3877126 h 3877126"/>
+              <a:gd name="connsiteX5" fmla="*/ 494271 w 6521823"/>
+              <a:gd name="connsiteY5" fmla="*/ 9462 h 3877126"/>
+              <a:gd name="connsiteX0" fmla="*/ 633621 w 6661173"/>
+              <a:gd name="connsiteY0" fmla="*/ 9462 h 3877126"/>
+              <a:gd name="connsiteX1" fmla="*/ 3663086 w 6661173"/>
+              <a:gd name="connsiteY1" fmla="*/ 95959 h 3877126"/>
+              <a:gd name="connsiteX2" fmla="*/ 6169447 w 6661173"/>
+              <a:gd name="connsiteY2" fmla="*/ 9462 h 3877126"/>
+              <a:gd name="connsiteX3" fmla="*/ 6305371 w 6661173"/>
+              <a:gd name="connsiteY3" fmla="*/ 3642348 h 3877126"/>
+              <a:gd name="connsiteX4" fmla="*/ 139350 w 6661173"/>
+              <a:gd name="connsiteY4" fmla="*/ 3877126 h 3877126"/>
+              <a:gd name="connsiteX5" fmla="*/ 633621 w 6661173"/>
+              <a:gd name="connsiteY5" fmla="*/ 9462 h 3877126"/>
+              <a:gd name="connsiteX0" fmla="*/ 633621 w 6661173"/>
+              <a:gd name="connsiteY0" fmla="*/ 256277 h 4123941"/>
+              <a:gd name="connsiteX1" fmla="*/ 3663086 w 6661173"/>
+              <a:gd name="connsiteY1" fmla="*/ 342774 h 4123941"/>
+              <a:gd name="connsiteX2" fmla="*/ 6169447 w 6661173"/>
+              <a:gd name="connsiteY2" fmla="*/ 256277 h 4123941"/>
+              <a:gd name="connsiteX3" fmla="*/ 6305371 w 6661173"/>
+              <a:gd name="connsiteY3" fmla="*/ 3889163 h 4123941"/>
+              <a:gd name="connsiteX4" fmla="*/ 139350 w 6661173"/>
+              <a:gd name="connsiteY4" fmla="*/ 4123941 h 4123941"/>
+              <a:gd name="connsiteX5" fmla="*/ 633621 w 6661173"/>
+              <a:gd name="connsiteY5" fmla="*/ 256277 h 4123941"/>
+              <a:gd name="connsiteX0" fmla="*/ 633621 w 6661173"/>
+              <a:gd name="connsiteY0" fmla="*/ 256277 h 4123941"/>
+              <a:gd name="connsiteX1" fmla="*/ 3663086 w 6661173"/>
+              <a:gd name="connsiteY1" fmla="*/ 342774 h 4123941"/>
+              <a:gd name="connsiteX2" fmla="*/ 6169447 w 6661173"/>
+              <a:gd name="connsiteY2" fmla="*/ 256277 h 4123941"/>
+              <a:gd name="connsiteX3" fmla="*/ 6305371 w 6661173"/>
+              <a:gd name="connsiteY3" fmla="*/ 3889163 h 4123941"/>
+              <a:gd name="connsiteX4" fmla="*/ 139350 w 6661173"/>
+              <a:gd name="connsiteY4" fmla="*/ 4123941 h 4123941"/>
+              <a:gd name="connsiteX5" fmla="*/ 633621 w 6661173"/>
+              <a:gd name="connsiteY5" fmla="*/ 256277 h 4123941"/>
+              <a:gd name="connsiteX0" fmla="*/ 633621 w 6661173"/>
+              <a:gd name="connsiteY0" fmla="*/ 235646 h 4103310"/>
+              <a:gd name="connsiteX1" fmla="*/ 3663086 w 6661173"/>
+              <a:gd name="connsiteY1" fmla="*/ 322143 h 4103310"/>
+              <a:gd name="connsiteX2" fmla="*/ 6169447 w 6661173"/>
+              <a:gd name="connsiteY2" fmla="*/ 235646 h 4103310"/>
+              <a:gd name="connsiteX3" fmla="*/ 6305371 w 6661173"/>
+              <a:gd name="connsiteY3" fmla="*/ 3868532 h 4103310"/>
+              <a:gd name="connsiteX4" fmla="*/ 139350 w 6661173"/>
+              <a:gd name="connsiteY4" fmla="*/ 4103310 h 4103310"/>
+              <a:gd name="connsiteX5" fmla="*/ 633621 w 6661173"/>
+              <a:gd name="connsiteY5" fmla="*/ 235646 h 4103310"/>
+              <a:gd name="connsiteX0" fmla="*/ 633621 w 6661173"/>
+              <a:gd name="connsiteY0" fmla="*/ 190623 h 4058287"/>
+              <a:gd name="connsiteX1" fmla="*/ 3663086 w 6661173"/>
+              <a:gd name="connsiteY1" fmla="*/ 277120 h 4058287"/>
+              <a:gd name="connsiteX2" fmla="*/ 6169447 w 6661173"/>
+              <a:gd name="connsiteY2" fmla="*/ 190623 h 4058287"/>
+              <a:gd name="connsiteX3" fmla="*/ 6305371 w 6661173"/>
+              <a:gd name="connsiteY3" fmla="*/ 3823509 h 4058287"/>
+              <a:gd name="connsiteX4" fmla="*/ 139350 w 6661173"/>
+              <a:gd name="connsiteY4" fmla="*/ 4058287 h 4058287"/>
+              <a:gd name="connsiteX5" fmla="*/ 633621 w 6661173"/>
+              <a:gd name="connsiteY5" fmla="*/ 190623 h 4058287"/>
+              <a:gd name="connsiteX0" fmla="*/ 633621 w 6661173"/>
+              <a:gd name="connsiteY0" fmla="*/ 97720 h 3965384"/>
+              <a:gd name="connsiteX1" fmla="*/ 3663086 w 6661173"/>
+              <a:gd name="connsiteY1" fmla="*/ 184217 h 3965384"/>
+              <a:gd name="connsiteX2" fmla="*/ 6169447 w 6661173"/>
+              <a:gd name="connsiteY2" fmla="*/ 97720 h 3965384"/>
+              <a:gd name="connsiteX3" fmla="*/ 6305371 w 6661173"/>
+              <a:gd name="connsiteY3" fmla="*/ 3730606 h 3965384"/>
+              <a:gd name="connsiteX4" fmla="*/ 139350 w 6661173"/>
+              <a:gd name="connsiteY4" fmla="*/ 3965384 h 3965384"/>
+              <a:gd name="connsiteX5" fmla="*/ 633621 w 6661173"/>
+              <a:gd name="connsiteY5" fmla="*/ 97720 h 3965384"/>
+              <a:gd name="connsiteX0" fmla="*/ 633621 w 6661173"/>
+              <a:gd name="connsiteY0" fmla="*/ 1219541 h 5087205"/>
+              <a:gd name="connsiteX1" fmla="*/ 3638074 w 6661173"/>
+              <a:gd name="connsiteY1" fmla="*/ 45649 h 5087205"/>
+              <a:gd name="connsiteX2" fmla="*/ 6169447 w 6661173"/>
+              <a:gd name="connsiteY2" fmla="*/ 1219541 h 5087205"/>
+              <a:gd name="connsiteX3" fmla="*/ 6305371 w 6661173"/>
+              <a:gd name="connsiteY3" fmla="*/ 4852427 h 5087205"/>
+              <a:gd name="connsiteX4" fmla="*/ 139350 w 6661173"/>
+              <a:gd name="connsiteY4" fmla="*/ 5087205 h 5087205"/>
+              <a:gd name="connsiteX5" fmla="*/ 633621 w 6661173"/>
+              <a:gd name="connsiteY5" fmla="*/ 1219541 h 5087205"/>
+              <a:gd name="connsiteX0" fmla="*/ 633621 w 6661173"/>
+              <a:gd name="connsiteY0" fmla="*/ 1368268 h 5235932"/>
+              <a:gd name="connsiteX1" fmla="*/ 3638074 w 6661173"/>
+              <a:gd name="connsiteY1" fmla="*/ 194376 h 5235932"/>
+              <a:gd name="connsiteX2" fmla="*/ 6169447 w 6661173"/>
+              <a:gd name="connsiteY2" fmla="*/ 1368268 h 5235932"/>
+              <a:gd name="connsiteX3" fmla="*/ 6305371 w 6661173"/>
+              <a:gd name="connsiteY3" fmla="*/ 5001154 h 5235932"/>
+              <a:gd name="connsiteX4" fmla="*/ 139350 w 6661173"/>
+              <a:gd name="connsiteY4" fmla="*/ 5235932 h 5235932"/>
+              <a:gd name="connsiteX5" fmla="*/ 633621 w 6661173"/>
+              <a:gd name="connsiteY5" fmla="*/ 1368268 h 5235932"/>
+              <a:gd name="connsiteX0" fmla="*/ 633621 w 6661173"/>
+              <a:gd name="connsiteY0" fmla="*/ 857602 h 4725266"/>
+              <a:gd name="connsiteX1" fmla="*/ 3613062 w 6661173"/>
+              <a:gd name="connsiteY1" fmla="*/ 252120 h 4725266"/>
+              <a:gd name="connsiteX2" fmla="*/ 6169447 w 6661173"/>
+              <a:gd name="connsiteY2" fmla="*/ 857602 h 4725266"/>
+              <a:gd name="connsiteX3" fmla="*/ 6305371 w 6661173"/>
+              <a:gd name="connsiteY3" fmla="*/ 4490488 h 4725266"/>
+              <a:gd name="connsiteX4" fmla="*/ 139350 w 6661173"/>
+              <a:gd name="connsiteY4" fmla="*/ 4725266 h 4725266"/>
+              <a:gd name="connsiteX5" fmla="*/ 633621 w 6661173"/>
+              <a:gd name="connsiteY5" fmla="*/ 857602 h 4725266"/>
+              <a:gd name="connsiteX0" fmla="*/ 633621 w 6661173"/>
+              <a:gd name="connsiteY0" fmla="*/ 1003890 h 4871554"/>
+              <a:gd name="connsiteX1" fmla="*/ 3613062 w 6661173"/>
+              <a:gd name="connsiteY1" fmla="*/ 398408 h 4871554"/>
+              <a:gd name="connsiteX2" fmla="*/ 6169447 w 6661173"/>
+              <a:gd name="connsiteY2" fmla="*/ 1003890 h 4871554"/>
+              <a:gd name="connsiteX3" fmla="*/ 6305371 w 6661173"/>
+              <a:gd name="connsiteY3" fmla="*/ 4636776 h 4871554"/>
+              <a:gd name="connsiteX4" fmla="*/ 139350 w 6661173"/>
+              <a:gd name="connsiteY4" fmla="*/ 4871554 h 4871554"/>
+              <a:gd name="connsiteX5" fmla="*/ 633621 w 6661173"/>
+              <a:gd name="connsiteY5" fmla="*/ 1003890 h 4871554"/>
+              <a:gd name="connsiteX0" fmla="*/ 633621 w 6661173"/>
+              <a:gd name="connsiteY0" fmla="*/ 1022408 h 4890072"/>
+              <a:gd name="connsiteX1" fmla="*/ 3613062 w 6661173"/>
+              <a:gd name="connsiteY1" fmla="*/ 416926 h 4890072"/>
+              <a:gd name="connsiteX2" fmla="*/ 6169447 w 6661173"/>
+              <a:gd name="connsiteY2" fmla="*/ 1022408 h 4890072"/>
+              <a:gd name="connsiteX3" fmla="*/ 6305371 w 6661173"/>
+              <a:gd name="connsiteY3" fmla="*/ 4655294 h 4890072"/>
+              <a:gd name="connsiteX4" fmla="*/ 139350 w 6661173"/>
+              <a:gd name="connsiteY4" fmla="*/ 4890072 h 4890072"/>
+              <a:gd name="connsiteX5" fmla="*/ 633621 w 6661173"/>
+              <a:gd name="connsiteY5" fmla="*/ 1022408 h 4890072"/>
+              <a:gd name="connsiteX0" fmla="*/ 633621 w 6661173"/>
+              <a:gd name="connsiteY0" fmla="*/ 819066 h 4686730"/>
+              <a:gd name="connsiteX1" fmla="*/ 3450480 w 6661173"/>
+              <a:gd name="connsiteY1" fmla="*/ 460719 h 4686730"/>
+              <a:gd name="connsiteX2" fmla="*/ 6169447 w 6661173"/>
+              <a:gd name="connsiteY2" fmla="*/ 819066 h 4686730"/>
+              <a:gd name="connsiteX3" fmla="*/ 6305371 w 6661173"/>
+              <a:gd name="connsiteY3" fmla="*/ 4451952 h 4686730"/>
+              <a:gd name="connsiteX4" fmla="*/ 139350 w 6661173"/>
+              <a:gd name="connsiteY4" fmla="*/ 4686730 h 4686730"/>
+              <a:gd name="connsiteX5" fmla="*/ 633621 w 6661173"/>
+              <a:gd name="connsiteY5" fmla="*/ 819066 h 4686730"/>
+              <a:gd name="connsiteX0" fmla="*/ 633621 w 6661173"/>
+              <a:gd name="connsiteY0" fmla="*/ 819066 h 5168644"/>
+              <a:gd name="connsiteX1" fmla="*/ 3450480 w 6661173"/>
+              <a:gd name="connsiteY1" fmla="*/ 460719 h 5168644"/>
+              <a:gd name="connsiteX2" fmla="*/ 6169447 w 6661173"/>
+              <a:gd name="connsiteY2" fmla="*/ 819066 h 5168644"/>
+              <a:gd name="connsiteX3" fmla="*/ 6305371 w 6661173"/>
+              <a:gd name="connsiteY3" fmla="*/ 4451952 h 5168644"/>
+              <a:gd name="connsiteX4" fmla="*/ 3251626 w 6661173"/>
+              <a:gd name="connsiteY4" fmla="*/ 5168644 h 5168644"/>
+              <a:gd name="connsiteX5" fmla="*/ 139350 w 6661173"/>
+              <a:gd name="connsiteY5" fmla="*/ 4686730 h 5168644"/>
+              <a:gd name="connsiteX6" fmla="*/ 633621 w 6661173"/>
+              <a:gd name="connsiteY6" fmla="*/ 819066 h 5168644"/>
+              <a:gd name="connsiteX0" fmla="*/ 633621 w 6661173"/>
+              <a:gd name="connsiteY0" fmla="*/ 819066 h 5168644"/>
+              <a:gd name="connsiteX1" fmla="*/ 3450480 w 6661173"/>
+              <a:gd name="connsiteY1" fmla="*/ 460719 h 5168644"/>
+              <a:gd name="connsiteX2" fmla="*/ 6169447 w 6661173"/>
+              <a:gd name="connsiteY2" fmla="*/ 819066 h 5168644"/>
+              <a:gd name="connsiteX3" fmla="*/ 6305371 w 6661173"/>
+              <a:gd name="connsiteY3" fmla="*/ 4451952 h 5168644"/>
+              <a:gd name="connsiteX4" fmla="*/ 3251626 w 6661173"/>
+              <a:gd name="connsiteY4" fmla="*/ 5168644 h 5168644"/>
+              <a:gd name="connsiteX5" fmla="*/ 139350 w 6661173"/>
+              <a:gd name="connsiteY5" fmla="*/ 4686730 h 5168644"/>
+              <a:gd name="connsiteX6" fmla="*/ 633621 w 6661173"/>
+              <a:gd name="connsiteY6" fmla="*/ 819066 h 5168644"/>
+              <a:gd name="connsiteX0" fmla="*/ 633621 w 6661173"/>
+              <a:gd name="connsiteY0" fmla="*/ 819066 h 5168644"/>
+              <a:gd name="connsiteX1" fmla="*/ 3450480 w 6661173"/>
+              <a:gd name="connsiteY1" fmla="*/ 460719 h 5168644"/>
+              <a:gd name="connsiteX2" fmla="*/ 6169447 w 6661173"/>
+              <a:gd name="connsiteY2" fmla="*/ 819066 h 5168644"/>
+              <a:gd name="connsiteX3" fmla="*/ 6305371 w 6661173"/>
+              <a:gd name="connsiteY3" fmla="*/ 4451952 h 5168644"/>
+              <a:gd name="connsiteX4" fmla="*/ 3251626 w 6661173"/>
+              <a:gd name="connsiteY4" fmla="*/ 5168644 h 5168644"/>
+              <a:gd name="connsiteX5" fmla="*/ 139350 w 6661173"/>
+              <a:gd name="connsiteY5" fmla="*/ 4686730 h 5168644"/>
+              <a:gd name="connsiteX6" fmla="*/ 633621 w 6661173"/>
+              <a:gd name="connsiteY6" fmla="*/ 819066 h 5168644"/>
+              <a:gd name="connsiteX0" fmla="*/ 633621 w 6661173"/>
+              <a:gd name="connsiteY0" fmla="*/ 819066 h 5329281"/>
+              <a:gd name="connsiteX1" fmla="*/ 3450480 w 6661173"/>
+              <a:gd name="connsiteY1" fmla="*/ 460719 h 5329281"/>
+              <a:gd name="connsiteX2" fmla="*/ 6169447 w 6661173"/>
+              <a:gd name="connsiteY2" fmla="*/ 819066 h 5329281"/>
+              <a:gd name="connsiteX3" fmla="*/ 6305371 w 6661173"/>
+              <a:gd name="connsiteY3" fmla="*/ 4451952 h 5329281"/>
+              <a:gd name="connsiteX4" fmla="*/ 4164582 w 6661173"/>
+              <a:gd name="connsiteY4" fmla="*/ 5329281 h 5329281"/>
+              <a:gd name="connsiteX5" fmla="*/ 139350 w 6661173"/>
+              <a:gd name="connsiteY5" fmla="*/ 4686730 h 5329281"/>
+              <a:gd name="connsiteX6" fmla="*/ 633621 w 6661173"/>
+              <a:gd name="connsiteY6" fmla="*/ 819066 h 5329281"/>
+              <a:gd name="connsiteX0" fmla="*/ 633621 w 6661173"/>
+              <a:gd name="connsiteY0" fmla="*/ 819066 h 5329281"/>
+              <a:gd name="connsiteX1" fmla="*/ 3450480 w 6661173"/>
+              <a:gd name="connsiteY1" fmla="*/ 460719 h 5329281"/>
+              <a:gd name="connsiteX2" fmla="*/ 6169447 w 6661173"/>
+              <a:gd name="connsiteY2" fmla="*/ 819066 h 5329281"/>
+              <a:gd name="connsiteX3" fmla="*/ 6305371 w 6661173"/>
+              <a:gd name="connsiteY3" fmla="*/ 4451952 h 5329281"/>
+              <a:gd name="connsiteX4" fmla="*/ 4164582 w 6661173"/>
+              <a:gd name="connsiteY4" fmla="*/ 5329281 h 5329281"/>
+              <a:gd name="connsiteX5" fmla="*/ 139350 w 6661173"/>
+              <a:gd name="connsiteY5" fmla="*/ 4686730 h 5329281"/>
+              <a:gd name="connsiteX6" fmla="*/ 633621 w 6661173"/>
+              <a:gd name="connsiteY6" fmla="*/ 819066 h 5329281"/>
+            </a:gdLst>
+            <a:ahLst/>
+            <a:cxnLst>
+              <a:cxn ang="0">
+                <a:pos x="connsiteX0" y="connsiteY0"/>
+              </a:cxn>
+              <a:cxn ang="0">
+                <a:pos x="connsiteX1" y="connsiteY1"/>
+              </a:cxn>
+              <a:cxn ang="0">
+                <a:pos x="connsiteX2" y="connsiteY2"/>
+              </a:cxn>
+              <a:cxn ang="0">
+                <a:pos x="connsiteX3" y="connsiteY3"/>
+              </a:cxn>
+              <a:cxn ang="0">
+                <a:pos x="connsiteX4" y="connsiteY4"/>
+              </a:cxn>
+              <a:cxn ang="0">
+                <a:pos x="connsiteX5" y="connsiteY5"/>
+              </a:cxn>
+              <a:cxn ang="0">
+                <a:pos x="connsiteX6" y="connsiteY6"/>
+              </a:cxn>
+            </a:cxnLst>
+            <a:rect l="l" t="t" r="r" b="b"/>
+            <a:pathLst>
+              <a:path w="6661173" h="5329281">
+                <a:moveTo>
+                  <a:pt x="633621" y="819066"/>
+                </a:moveTo>
+                <a:cubicBezTo>
+                  <a:pt x="1688751" y="765520"/>
+                  <a:pt x="3213093" y="-733768"/>
+                  <a:pt x="3450480" y="460719"/>
+                </a:cubicBezTo>
+                <a:cubicBezTo>
+                  <a:pt x="3948812" y="-717291"/>
+                  <a:pt x="5333993" y="847898"/>
+                  <a:pt x="6169447" y="819066"/>
+                </a:cubicBezTo>
+                <a:cubicBezTo>
+                  <a:pt x="7215653" y="1313337"/>
+                  <a:pt x="6260063" y="3240990"/>
+                  <a:pt x="6305371" y="4451952"/>
+                </a:cubicBezTo>
+                <a:cubicBezTo>
+                  <a:pt x="5308300" y="4489022"/>
+                  <a:pt x="4761453" y="4414882"/>
+                  <a:pt x="4164582" y="5329281"/>
+                </a:cubicBezTo>
+                <a:cubicBezTo>
+                  <a:pt x="3815001" y="4600232"/>
+                  <a:pt x="1176775" y="4847368"/>
+                  <a:pt x="139350" y="4686730"/>
+                </a:cubicBezTo>
+                <a:cubicBezTo>
+                  <a:pt x="-313731" y="3409866"/>
+                  <a:pt x="468864" y="2108287"/>
+                  <a:pt x="633621" y="819066"/>
                 </a:cubicBezTo>
                 <a:close/>
               </a:path>
@@ -4564,7 +5740,7 @@
           <a:lstStyle/>
           <a:p>
             <a:pPr algn="ctr"/>
-            <a:endParaRPr lang="en-US"/>
+            <a:endParaRPr lang="en-US" dirty="0"/>
           </a:p>
         </p:txBody>
       </p:sp>
@@ -4619,7 +5795,7 @@
       </p:sp>
       <p:sp>
         <p:nvSpPr>
-          <p:cNvPr id="4" name="Oval 3">
+          <p:cNvPr id="4" name=".details(super, 10)">
             <a:extLst>
               <a:ext uri="{FF2B5EF4-FFF2-40B4-BE49-F238E27FC236}">
                 <a16:creationId xmlns:a16="http://schemas.microsoft.com/office/drawing/2014/main" id="{C9A60727-F29A-1C45-BC54-FEB54C0D5FBD}"/>
@@ -4630,8 +5806,8 @@
           <p:nvPr/>
         </p:nvSpPr>
         <p:spPr>
-          <a:xfrm>
-            <a:off x="3243649" y="4205416"/>
+          <a:xfrm rot="20187133">
+            <a:off x="3228678" y="4530811"/>
             <a:ext cx="1767016" cy="858795"/>
           </a:xfrm>
           <a:prstGeom prst="ellipse">
@@ -4665,7 +5841,7 @@
       </p:sp>
       <p:sp>
         <p:nvSpPr>
-          <p:cNvPr id="5" name="Oval 4">
+          <p:cNvPr id="5" name=".details(super, 10)">
             <a:extLst>
               <a:ext uri="{FF2B5EF4-FFF2-40B4-BE49-F238E27FC236}">
                 <a16:creationId xmlns:a16="http://schemas.microsoft.com/office/drawing/2014/main" id="{10181912-E79F-8A49-9138-D3339818D8F6}"/>
@@ -4676,8 +5852,8 @@
           <p:nvPr/>
         </p:nvSpPr>
         <p:spPr>
-          <a:xfrm>
-            <a:off x="7246722" y="4530811"/>
+          <a:xfrm rot="1480770">
+            <a:off x="6581147" y="4437647"/>
             <a:ext cx="1767016" cy="858795"/>
           </a:xfrm>
           <a:prstGeom prst="ellipse">
@@ -4711,7 +5887,7 @@
       </p:sp>
       <p:sp>
         <p:nvSpPr>
-          <p:cNvPr id="6" name="Oval 5">
+          <p:cNvPr id="6" name=".details(super, 10)">
             <a:extLst>
               <a:ext uri="{FF2B5EF4-FFF2-40B4-BE49-F238E27FC236}">
                 <a16:creationId xmlns:a16="http://schemas.microsoft.com/office/drawing/2014/main" id="{CCDD251F-BE9B-2646-A4D4-5E1B0A571B7A}"/>
@@ -4722,7 +5898,7 @@
           <p:nvPr/>
         </p:nvSpPr>
         <p:spPr>
-          <a:xfrm>
+          <a:xfrm rot="21010184">
             <a:off x="3587578" y="3135527"/>
             <a:ext cx="1767016" cy="858795"/>
           </a:xfrm>
@@ -4757,7 +5933,7 @@
       </p:sp>
       <p:sp>
         <p:nvSpPr>
-          <p:cNvPr id="7" name="Oval 6">
+          <p:cNvPr id="7" name=".details(super, 10)">
             <a:extLst>
               <a:ext uri="{FF2B5EF4-FFF2-40B4-BE49-F238E27FC236}">
                 <a16:creationId xmlns:a16="http://schemas.microsoft.com/office/drawing/2014/main" id="{0B6BB5DB-69C0-1844-A9AA-1F73099B3E5D}"/>
@@ -4768,7 +5944,7 @@
           <p:nvPr/>
         </p:nvSpPr>
         <p:spPr>
-          <a:xfrm>
+          <a:xfrm rot="660890">
             <a:off x="5910648" y="3223053"/>
             <a:ext cx="1767016" cy="858795"/>
           </a:xfrm>
@@ -4803,7 +5979,7 @@
       </p:sp>
       <p:sp>
         <p:nvSpPr>
-          <p:cNvPr id="8" name="Oval 7">
+          <p:cNvPr id="8" name=".details(super, 10)">
             <a:extLst>
               <a:ext uri="{FF2B5EF4-FFF2-40B4-BE49-F238E27FC236}">
                 <a16:creationId xmlns:a16="http://schemas.microsoft.com/office/drawing/2014/main" id="{1392DB2F-9EA1-3A40-AD21-5373E3BABC50}"/>
@@ -4861,7 +6037,7 @@
         </p:nvSpPr>
         <p:spPr>
           <a:xfrm>
-            <a:off x="5634681" y="4634813"/>
+            <a:off x="5276957" y="3994953"/>
             <a:ext cx="864973" cy="651820"/>
           </a:xfrm>
           <a:prstGeom prst="smileyFace">
@@ -4942,6 +6118,438 @@
     <p:extLst>
       <p:ext uri="{BB962C8B-B14F-4D97-AF65-F5344CB8AC3E}">
         <p14:creationId xmlns:p14="http://schemas.microsoft.com/office/powerpoint/2010/main" val="8491993"/>
+      </p:ext>
+    </p:extLst>
+  </p:cSld>
+  <p:clrMapOvr>
+    <a:masterClrMapping/>
+  </p:clrMapOvr>
+</p:sld>
+</file>
+
+<file path=ppt/slides/slide3.xml><?xml version="1.0" encoding="utf-8"?>
+<p:sld xmlns:a="http://schemas.openxmlformats.org/drawingml/2006/main" xmlns:r="http://schemas.openxmlformats.org/officeDocument/2006/relationships" xmlns:p="http://schemas.openxmlformats.org/presentationml/2006/main">
+  <p:cSld>
+    <p:spTree>
+      <p:nvGrpSpPr>
+        <p:cNvPr id="1" name=""/>
+        <p:cNvGrpSpPr/>
+        <p:nvPr/>
+      </p:nvGrpSpPr>
+      <p:grpSpPr>
+        <a:xfrm>
+          <a:off x="0" y="0"/>
+          <a:ext cx="0" cy="0"/>
+          <a:chOff x="0" y="0"/>
+          <a:chExt cx="0" cy="0"/>
+        </a:xfrm>
+      </p:grpSpPr>
+      <p:sp>
+        <p:nvSpPr>
+          <p:cNvPr id="2" name=".id(x)">
+            <a:extLst>
+              <a:ext uri="{FF2B5EF4-FFF2-40B4-BE49-F238E27FC236}">
+                <a16:creationId xmlns:a16="http://schemas.microsoft.com/office/drawing/2014/main" id="{FEF7A5EF-AF48-F048-B113-3590856B53E9}"/>
+              </a:ext>
+            </a:extLst>
+          </p:cNvPr>
+          <p:cNvSpPr/>
+          <p:nvPr/>
+        </p:nvSpPr>
+        <p:spPr>
+          <a:xfrm>
+            <a:off x="2474919" y="2021360"/>
+            <a:ext cx="6016356" cy="4334002"/>
+          </a:xfrm>
+          <a:custGeom>
+            <a:avLst/>
+            <a:gdLst>
+              <a:gd name="connsiteX0" fmla="*/ 0 w 6005877"/>
+              <a:gd name="connsiteY0" fmla="*/ 1459471 h 2918942"/>
+              <a:gd name="connsiteX1" fmla="*/ 3002939 w 6005877"/>
+              <a:gd name="connsiteY1" fmla="*/ 0 h 2918942"/>
+              <a:gd name="connsiteX2" fmla="*/ 6005878 w 6005877"/>
+              <a:gd name="connsiteY2" fmla="*/ 1459471 h 2918942"/>
+              <a:gd name="connsiteX3" fmla="*/ 3002939 w 6005877"/>
+              <a:gd name="connsiteY3" fmla="*/ 2918942 h 2918942"/>
+              <a:gd name="connsiteX4" fmla="*/ 0 w 6005877"/>
+              <a:gd name="connsiteY4" fmla="*/ 1459471 h 2918942"/>
+              <a:gd name="connsiteX0" fmla="*/ 0 w 6005878"/>
+              <a:gd name="connsiteY0" fmla="*/ 1459471 h 3143890"/>
+              <a:gd name="connsiteX1" fmla="*/ 3002939 w 6005878"/>
+              <a:gd name="connsiteY1" fmla="*/ 0 h 3143890"/>
+              <a:gd name="connsiteX2" fmla="*/ 6005878 w 6005878"/>
+              <a:gd name="connsiteY2" fmla="*/ 1459471 h 3143890"/>
+              <a:gd name="connsiteX3" fmla="*/ 3002939 w 6005878"/>
+              <a:gd name="connsiteY3" fmla="*/ 2918942 h 3143890"/>
+              <a:gd name="connsiteX4" fmla="*/ 0 w 6005878"/>
+              <a:gd name="connsiteY4" fmla="*/ 1459471 h 3143890"/>
+              <a:gd name="connsiteX0" fmla="*/ 0 w 6005878"/>
+              <a:gd name="connsiteY0" fmla="*/ 1459471 h 3184887"/>
+              <a:gd name="connsiteX1" fmla="*/ 3002939 w 6005878"/>
+              <a:gd name="connsiteY1" fmla="*/ 0 h 3184887"/>
+              <a:gd name="connsiteX2" fmla="*/ 6005878 w 6005878"/>
+              <a:gd name="connsiteY2" fmla="*/ 1459471 h 3184887"/>
+              <a:gd name="connsiteX3" fmla="*/ 3002939 w 6005878"/>
+              <a:gd name="connsiteY3" fmla="*/ 2918942 h 3184887"/>
+              <a:gd name="connsiteX4" fmla="*/ 0 w 6005878"/>
+              <a:gd name="connsiteY4" fmla="*/ 1459471 h 3184887"/>
+              <a:gd name="connsiteX0" fmla="*/ 0 w 6005878"/>
+              <a:gd name="connsiteY0" fmla="*/ 1459471 h 2918942"/>
+              <a:gd name="connsiteX1" fmla="*/ 3002939 w 6005878"/>
+              <a:gd name="connsiteY1" fmla="*/ 0 h 2918942"/>
+              <a:gd name="connsiteX2" fmla="*/ 6005878 w 6005878"/>
+              <a:gd name="connsiteY2" fmla="*/ 1459471 h 2918942"/>
+              <a:gd name="connsiteX3" fmla="*/ 3002939 w 6005878"/>
+              <a:gd name="connsiteY3" fmla="*/ 2918942 h 2918942"/>
+              <a:gd name="connsiteX4" fmla="*/ 0 w 6005878"/>
+              <a:gd name="connsiteY4" fmla="*/ 1459471 h 2918942"/>
+              <a:gd name="connsiteX0" fmla="*/ 3 w 6005881"/>
+              <a:gd name="connsiteY0" fmla="*/ 1459471 h 3308686"/>
+              <a:gd name="connsiteX1" fmla="*/ 3002942 w 6005881"/>
+              <a:gd name="connsiteY1" fmla="*/ 0 h 3308686"/>
+              <a:gd name="connsiteX2" fmla="*/ 6005881 w 6005881"/>
+              <a:gd name="connsiteY2" fmla="*/ 1459471 h 3308686"/>
+              <a:gd name="connsiteX3" fmla="*/ 3017932 w 6005881"/>
+              <a:gd name="connsiteY3" fmla="*/ 3308686 h 3308686"/>
+              <a:gd name="connsiteX4" fmla="*/ 3 w 6005881"/>
+              <a:gd name="connsiteY4" fmla="*/ 1459471 h 3308686"/>
+              <a:gd name="connsiteX0" fmla="*/ 3 w 6005881"/>
+              <a:gd name="connsiteY0" fmla="*/ 1459471 h 3381869"/>
+              <a:gd name="connsiteX1" fmla="*/ 3002942 w 6005881"/>
+              <a:gd name="connsiteY1" fmla="*/ 0 h 3381869"/>
+              <a:gd name="connsiteX2" fmla="*/ 6005881 w 6005881"/>
+              <a:gd name="connsiteY2" fmla="*/ 1459471 h 3381869"/>
+              <a:gd name="connsiteX3" fmla="*/ 3017932 w 6005881"/>
+              <a:gd name="connsiteY3" fmla="*/ 3308686 h 3381869"/>
+              <a:gd name="connsiteX4" fmla="*/ 3 w 6005881"/>
+              <a:gd name="connsiteY4" fmla="*/ 1459471 h 3381869"/>
+              <a:gd name="connsiteX0" fmla="*/ 3 w 6005881"/>
+              <a:gd name="connsiteY0" fmla="*/ 1459471 h 3311636"/>
+              <a:gd name="connsiteX1" fmla="*/ 3002942 w 6005881"/>
+              <a:gd name="connsiteY1" fmla="*/ 0 h 3311636"/>
+              <a:gd name="connsiteX2" fmla="*/ 6005881 w 6005881"/>
+              <a:gd name="connsiteY2" fmla="*/ 1459471 h 3311636"/>
+              <a:gd name="connsiteX3" fmla="*/ 3017932 w 6005881"/>
+              <a:gd name="connsiteY3" fmla="*/ 3308686 h 3311636"/>
+              <a:gd name="connsiteX4" fmla="*/ 3 w 6005881"/>
+              <a:gd name="connsiteY4" fmla="*/ 1459471 h 3311636"/>
+              <a:gd name="connsiteX0" fmla="*/ 3 w 6005881"/>
+              <a:gd name="connsiteY0" fmla="*/ 1459471 h 3312859"/>
+              <a:gd name="connsiteX1" fmla="*/ 3002942 w 6005881"/>
+              <a:gd name="connsiteY1" fmla="*/ 0 h 3312859"/>
+              <a:gd name="connsiteX2" fmla="*/ 6005881 w 6005881"/>
+              <a:gd name="connsiteY2" fmla="*/ 1459471 h 3312859"/>
+              <a:gd name="connsiteX3" fmla="*/ 3017932 w 6005881"/>
+              <a:gd name="connsiteY3" fmla="*/ 3308686 h 3312859"/>
+              <a:gd name="connsiteX4" fmla="*/ 3 w 6005881"/>
+              <a:gd name="connsiteY4" fmla="*/ 1459471 h 3312859"/>
+              <a:gd name="connsiteX0" fmla="*/ 3 w 6014752"/>
+              <a:gd name="connsiteY0" fmla="*/ 1459471 h 3489476"/>
+              <a:gd name="connsiteX1" fmla="*/ 3002942 w 6014752"/>
+              <a:gd name="connsiteY1" fmla="*/ 0 h 3489476"/>
+              <a:gd name="connsiteX2" fmla="*/ 6005881 w 6014752"/>
+              <a:gd name="connsiteY2" fmla="*/ 1459471 h 3489476"/>
+              <a:gd name="connsiteX3" fmla="*/ 3894817 w 6014752"/>
+              <a:gd name="connsiteY3" fmla="*/ 3210209 h 3489476"/>
+              <a:gd name="connsiteX4" fmla="*/ 3017932 w 6014752"/>
+              <a:gd name="connsiteY4" fmla="*/ 3308686 h 3489476"/>
+              <a:gd name="connsiteX5" fmla="*/ 3 w 6014752"/>
+              <a:gd name="connsiteY5" fmla="*/ 1459471 h 3489476"/>
+              <a:gd name="connsiteX0" fmla="*/ 3 w 6014896"/>
+              <a:gd name="connsiteY0" fmla="*/ 1459471 h 4064043"/>
+              <a:gd name="connsiteX1" fmla="*/ 3002942 w 6014896"/>
+              <a:gd name="connsiteY1" fmla="*/ 0 h 4064043"/>
+              <a:gd name="connsiteX2" fmla="*/ 6005881 w 6014896"/>
+              <a:gd name="connsiteY2" fmla="*/ 1459471 h 4064043"/>
+              <a:gd name="connsiteX3" fmla="*/ 3924797 w 6014896"/>
+              <a:gd name="connsiteY3" fmla="*/ 3974707 h 4064043"/>
+              <a:gd name="connsiteX4" fmla="*/ 3017932 w 6014896"/>
+              <a:gd name="connsiteY4" fmla="*/ 3308686 h 4064043"/>
+              <a:gd name="connsiteX5" fmla="*/ 3 w 6014896"/>
+              <a:gd name="connsiteY5" fmla="*/ 1459471 h 4064043"/>
+              <a:gd name="connsiteX0" fmla="*/ 1072 w 6015965"/>
+              <a:gd name="connsiteY0" fmla="*/ 1459471 h 4308381"/>
+              <a:gd name="connsiteX1" fmla="*/ 3004011 w 6015965"/>
+              <a:gd name="connsiteY1" fmla="*/ 0 h 4308381"/>
+              <a:gd name="connsiteX2" fmla="*/ 6006950 w 6015965"/>
+              <a:gd name="connsiteY2" fmla="*/ 1459471 h 4308381"/>
+              <a:gd name="connsiteX3" fmla="*/ 3925866 w 6015965"/>
+              <a:gd name="connsiteY3" fmla="*/ 3974707 h 4308381"/>
+              <a:gd name="connsiteX4" fmla="*/ 2674227 w 6015965"/>
+              <a:gd name="connsiteY4" fmla="*/ 4073184 h 4308381"/>
+              <a:gd name="connsiteX5" fmla="*/ 1072 w 6015965"/>
+              <a:gd name="connsiteY5" fmla="*/ 1459471 h 4308381"/>
+              <a:gd name="connsiteX0" fmla="*/ 1087 w 6015980"/>
+              <a:gd name="connsiteY0" fmla="*/ 1459471 h 4334002"/>
+              <a:gd name="connsiteX1" fmla="*/ 3004026 w 6015980"/>
+              <a:gd name="connsiteY1" fmla="*/ 0 h 4334002"/>
+              <a:gd name="connsiteX2" fmla="*/ 6006965 w 6015980"/>
+              <a:gd name="connsiteY2" fmla="*/ 1459471 h 4334002"/>
+              <a:gd name="connsiteX3" fmla="*/ 3925881 w 6015980"/>
+              <a:gd name="connsiteY3" fmla="*/ 3974707 h 4334002"/>
+              <a:gd name="connsiteX4" fmla="*/ 2674242 w 6015980"/>
+              <a:gd name="connsiteY4" fmla="*/ 4073184 h 4334002"/>
+              <a:gd name="connsiteX5" fmla="*/ 1087 w 6015980"/>
+              <a:gd name="connsiteY5" fmla="*/ 1459471 h 4334002"/>
+              <a:gd name="connsiteX0" fmla="*/ 1087 w 6016356"/>
+              <a:gd name="connsiteY0" fmla="*/ 1459471 h 4334002"/>
+              <a:gd name="connsiteX1" fmla="*/ 3004026 w 6016356"/>
+              <a:gd name="connsiteY1" fmla="*/ 0 h 4334002"/>
+              <a:gd name="connsiteX2" fmla="*/ 6006965 w 6016356"/>
+              <a:gd name="connsiteY2" fmla="*/ 1459471 h 4334002"/>
+              <a:gd name="connsiteX3" fmla="*/ 3925881 w 6016356"/>
+              <a:gd name="connsiteY3" fmla="*/ 3974707 h 4334002"/>
+              <a:gd name="connsiteX4" fmla="*/ 2674242 w 6016356"/>
+              <a:gd name="connsiteY4" fmla="*/ 4073184 h 4334002"/>
+              <a:gd name="connsiteX5" fmla="*/ 1087 w 6016356"/>
+              <a:gd name="connsiteY5" fmla="*/ 1459471 h 4334002"/>
+              <a:gd name="connsiteX0" fmla="*/ 1087 w 6016356"/>
+              <a:gd name="connsiteY0" fmla="*/ 1459471 h 4334002"/>
+              <a:gd name="connsiteX1" fmla="*/ 3004026 w 6016356"/>
+              <a:gd name="connsiteY1" fmla="*/ 0 h 4334002"/>
+              <a:gd name="connsiteX2" fmla="*/ 6006965 w 6016356"/>
+              <a:gd name="connsiteY2" fmla="*/ 1459471 h 4334002"/>
+              <a:gd name="connsiteX3" fmla="*/ 3925881 w 6016356"/>
+              <a:gd name="connsiteY3" fmla="*/ 3974707 h 4334002"/>
+              <a:gd name="connsiteX4" fmla="*/ 2674242 w 6016356"/>
+              <a:gd name="connsiteY4" fmla="*/ 4073184 h 4334002"/>
+              <a:gd name="connsiteX5" fmla="*/ 1087 w 6016356"/>
+              <a:gd name="connsiteY5" fmla="*/ 1459471 h 4334002"/>
+            </a:gdLst>
+            <a:ahLst/>
+            <a:cxnLst>
+              <a:cxn ang="0">
+                <a:pos x="connsiteX0" y="connsiteY0"/>
+              </a:cxn>
+              <a:cxn ang="0">
+                <a:pos x="connsiteX1" y="connsiteY1"/>
+              </a:cxn>
+              <a:cxn ang="0">
+                <a:pos x="connsiteX2" y="connsiteY2"/>
+              </a:cxn>
+              <a:cxn ang="0">
+                <a:pos x="connsiteX3" y="connsiteY3"/>
+              </a:cxn>
+              <a:cxn ang="0">
+                <a:pos x="connsiteX4" y="connsiteY4"/>
+              </a:cxn>
+              <a:cxn ang="0">
+                <a:pos x="connsiteX5" y="connsiteY5"/>
+              </a:cxn>
+            </a:cxnLst>
+            <a:rect l="l" t="t" r="r" b="b"/>
+            <a:pathLst>
+              <a:path w="6016356" h="4334002">
+                <a:moveTo>
+                  <a:pt x="1087" y="1459471"/>
+                </a:moveTo>
+                <a:cubicBezTo>
+                  <a:pt x="56051" y="780607"/>
+                  <a:pt x="1345549" y="0"/>
+                  <a:pt x="3004026" y="0"/>
+                </a:cubicBezTo>
+                <a:cubicBezTo>
+                  <a:pt x="4662503" y="0"/>
+                  <a:pt x="5858319" y="924436"/>
+                  <a:pt x="6006965" y="1459471"/>
+                </a:cubicBezTo>
+                <a:cubicBezTo>
+                  <a:pt x="6155611" y="1994506"/>
+                  <a:pt x="4498823" y="4490964"/>
+                  <a:pt x="3925881" y="3974707"/>
+                </a:cubicBezTo>
+                <a:cubicBezTo>
+                  <a:pt x="3397910" y="3428469"/>
+                  <a:pt x="3358355" y="2903432"/>
+                  <a:pt x="2674242" y="4073184"/>
+                </a:cubicBezTo>
+                <a:cubicBezTo>
+                  <a:pt x="1990129" y="5242936"/>
+                  <a:pt x="-53877" y="2138335"/>
+                  <a:pt x="1087" y="1459471"/>
+                </a:cubicBezTo>
+                <a:close/>
+              </a:path>
+            </a:pathLst>
+          </a:custGeom>
+        </p:spPr>
+        <p:style>
+          <a:lnRef idx="2">
+            <a:schemeClr val="accent1">
+              <a:shade val="50000"/>
+            </a:schemeClr>
+          </a:lnRef>
+          <a:fillRef idx="1">
+            <a:schemeClr val="accent1"/>
+          </a:fillRef>
+          <a:effectRef idx="0">
+            <a:schemeClr val="accent1"/>
+          </a:effectRef>
+          <a:fontRef idx="minor">
+            <a:schemeClr val="lt1"/>
+          </a:fontRef>
+        </p:style>
+        <p:txBody>
+          <a:bodyPr rtlCol="0" anchor="ctr"/>
+          <a:lstStyle/>
+          <a:p>
+            <a:pPr algn="ctr"/>
+            <a:endParaRPr lang="en-US"/>
+          </a:p>
+        </p:txBody>
+      </p:sp>
+      <p:sp>
+        <p:nvSpPr>
+          <p:cNvPr id="3" name="5-point Star 2">
+            <a:extLst>
+              <a:ext uri="{FF2B5EF4-FFF2-40B4-BE49-F238E27FC236}">
+                <a16:creationId xmlns:a16="http://schemas.microsoft.com/office/drawing/2014/main" id="{B2446121-1866-D943-920E-05056580DAB4}"/>
+              </a:ext>
+            </a:extLst>
+          </p:cNvPr>
+          <p:cNvSpPr/>
+          <p:nvPr/>
+        </p:nvSpPr>
+        <p:spPr>
+          <a:xfrm>
+            <a:off x="3708400" y="2857500"/>
+            <a:ext cx="914400" cy="965200"/>
+          </a:xfrm>
+          <a:prstGeom prst="star5">
+            <a:avLst/>
+          </a:prstGeom>
+          <a:solidFill>
+            <a:srgbClr val="FFC000"/>
+          </a:solidFill>
+        </p:spPr>
+        <p:style>
+          <a:lnRef idx="2">
+            <a:schemeClr val="accent1">
+              <a:shade val="50000"/>
+            </a:schemeClr>
+          </a:lnRef>
+          <a:fillRef idx="1">
+            <a:schemeClr val="accent1"/>
+          </a:fillRef>
+          <a:effectRef idx="0">
+            <a:schemeClr val="accent1"/>
+          </a:effectRef>
+          <a:fontRef idx="minor">
+            <a:schemeClr val="lt1"/>
+          </a:fontRef>
+        </p:style>
+        <p:txBody>
+          <a:bodyPr rtlCol="0" anchor="ctr"/>
+          <a:lstStyle/>
+          <a:p>
+            <a:pPr algn="ctr"/>
+            <a:endParaRPr lang="en-US"/>
+          </a:p>
+        </p:txBody>
+      </p:sp>
+      <p:sp>
+        <p:nvSpPr>
+          <p:cNvPr id="4" name="5-point Star 3">
+            <a:extLst>
+              <a:ext uri="{FF2B5EF4-FFF2-40B4-BE49-F238E27FC236}">
+                <a16:creationId xmlns:a16="http://schemas.microsoft.com/office/drawing/2014/main" id="{7A69A318-2A31-A14F-9E0F-C55E0637D5C0}"/>
+              </a:ext>
+            </a:extLst>
+          </p:cNvPr>
+          <p:cNvSpPr/>
+          <p:nvPr/>
+        </p:nvSpPr>
+        <p:spPr>
+          <a:xfrm>
+            <a:off x="5021744" y="2222500"/>
+            <a:ext cx="914400" cy="965200"/>
+          </a:xfrm>
+          <a:prstGeom prst="star5">
+            <a:avLst/>
+          </a:prstGeom>
+          <a:solidFill>
+            <a:srgbClr val="FFC000"/>
+          </a:solidFill>
+        </p:spPr>
+        <p:style>
+          <a:lnRef idx="2">
+            <a:schemeClr val="accent1">
+              <a:shade val="50000"/>
+            </a:schemeClr>
+          </a:lnRef>
+          <a:fillRef idx="1">
+            <a:schemeClr val="accent1"/>
+          </a:fillRef>
+          <a:effectRef idx="0">
+            <a:schemeClr val="accent1"/>
+          </a:effectRef>
+          <a:fontRef idx="minor">
+            <a:schemeClr val="lt1"/>
+          </a:fontRef>
+        </p:style>
+        <p:txBody>
+          <a:bodyPr rtlCol="0" anchor="ctr"/>
+          <a:lstStyle/>
+          <a:p>
+            <a:pPr algn="ctr"/>
+            <a:endParaRPr lang="en-US"/>
+          </a:p>
+        </p:txBody>
+      </p:sp>
+      <p:sp>
+        <p:nvSpPr>
+          <p:cNvPr id="5" name="5-point Star 4">
+            <a:extLst>
+              <a:ext uri="{FF2B5EF4-FFF2-40B4-BE49-F238E27FC236}">
+                <a16:creationId xmlns:a16="http://schemas.microsoft.com/office/drawing/2014/main" id="{29EB3690-969B-5248-BB34-50BA748C054A}"/>
+              </a:ext>
+            </a:extLst>
+          </p:cNvPr>
+          <p:cNvSpPr/>
+          <p:nvPr/>
+        </p:nvSpPr>
+        <p:spPr>
+          <a:xfrm>
+            <a:off x="6777213" y="2998229"/>
+            <a:ext cx="914400" cy="965200"/>
+          </a:xfrm>
+          <a:prstGeom prst="star5">
+            <a:avLst/>
+          </a:prstGeom>
+          <a:solidFill>
+            <a:srgbClr val="FFC000"/>
+          </a:solidFill>
+        </p:spPr>
+        <p:style>
+          <a:lnRef idx="2">
+            <a:schemeClr val="accent1">
+              <a:shade val="50000"/>
+            </a:schemeClr>
+          </a:lnRef>
+          <a:fillRef idx="1">
+            <a:schemeClr val="accent1"/>
+          </a:fillRef>
+          <a:effectRef idx="0">
+            <a:schemeClr val="accent1"/>
+          </a:effectRef>
+          <a:fontRef idx="minor">
+            <a:schemeClr val="lt1"/>
+          </a:fontRef>
+        </p:style>
+        <p:txBody>
+          <a:bodyPr rtlCol="0" anchor="ctr"/>
+          <a:lstStyle/>
+          <a:p>
+            <a:pPr algn="ctr"/>
+            <a:endParaRPr lang="en-US"/>
+          </a:p>
+        </p:txBody>
+      </p:sp>
+    </p:spTree>
+    <p:extLst>
+      <p:ext uri="{BB962C8B-B14F-4D97-AF65-F5344CB8AC3E}">
+        <p14:creationId xmlns:p14="http://schemas.microsoft.com/office/powerpoint/2010/main" val="261988111"/>
       </p:ext>
     </p:extLst>
   </p:cSld>

</xml_diff>